<commit_message>
extra notes for umbraco usergroup
</commit_message>
<xml_diff>
--- a/http api patterns.pptx
+++ b/http api patterns.pptx
@@ -250,7 +250,7 @@
           <a:p>
             <a:fld id="{93CF67F0-06F5-4765-BC93-E20BF5EE4AAD}" type="datetimeFigureOut">
               <a:rPr lang="en-GB" smtClean="0"/>
-              <a:t>02/07/2019</a:t>
+              <a:t>20/11/2019</a:t>
             </a:fld>
             <a:endParaRPr lang="en-GB"/>
           </a:p>
@@ -709,21 +709,70 @@
           <a:lstStyle/>
           <a:p>
             <a:r>
-              <a:rPr lang="en-US" dirty="0"/>
-              <a:t>PUT the change with the whole resource.</a:t>
-            </a:r>
-          </a:p>
-          <a:p>
-            <a:endParaRPr lang="en-US" dirty="0"/>
-          </a:p>
-          <a:p>
-            <a:r>
-              <a:rPr lang="en-US" dirty="0"/>
-              <a:t>Issues …. Not all things can change</a:t>
-            </a:r>
-          </a:p>
-          <a:p>
-            <a:endParaRPr lang="en-US" dirty="0"/>
+              <a:rPr lang="en-GB" sz="1200" b="0" i="0" kern="1200" dirty="0">
+                <a:solidFill>
+                  <a:schemeClr val="tx1"/>
+                </a:solidFill>
+                <a:effectLst/>
+                <a:latin typeface="+mn-lt"/>
+                <a:ea typeface="+mn-ea"/>
+                <a:cs typeface="+mn-cs"/>
+              </a:rPr>
+              <a:t>Should you return the body?</a:t>
+            </a:r>
+          </a:p>
+          <a:p>
+            <a:r>
+              <a:rPr lang="en-GB" sz="1200" b="0" i="0" kern="1200" dirty="0">
+                <a:solidFill>
+                  <a:schemeClr val="tx1"/>
+                </a:solidFill>
+                <a:effectLst/>
+                <a:latin typeface="+mn-lt"/>
+                <a:ea typeface="+mn-ea"/>
+                <a:cs typeface="+mn-cs"/>
+              </a:rPr>
+              <a:t>https://www.w3.org/Protocols/rfc2616/rfc2616-sec10.html#sec10.2.2</a:t>
+            </a:r>
+          </a:p>
+          <a:p>
+            <a:r>
+              <a:rPr lang="en-GB" sz="1200" b="0" i="0" kern="1200" dirty="0">
+                <a:solidFill>
+                  <a:schemeClr val="tx1"/>
+                </a:solidFill>
+                <a:effectLst/>
+                <a:latin typeface="+mn-lt"/>
+                <a:ea typeface="+mn-ea"/>
+                <a:cs typeface="+mn-cs"/>
+              </a:rPr>
+              <a:t>The resource must be created before returning 201</a:t>
+            </a:r>
+          </a:p>
+          <a:p>
+            <a:endParaRPr lang="en-GB" sz="1200" b="0" i="0" kern="1200" dirty="0">
+              <a:solidFill>
+                <a:schemeClr val="tx1"/>
+              </a:solidFill>
+              <a:effectLst/>
+              <a:latin typeface="+mn-lt"/>
+              <a:ea typeface="+mn-ea"/>
+              <a:cs typeface="+mn-cs"/>
+            </a:endParaRPr>
+          </a:p>
+          <a:p>
+            <a:endParaRPr lang="en-GB" sz="1200" b="0" i="0" kern="1200" dirty="0">
+              <a:solidFill>
+                <a:schemeClr val="tx1"/>
+              </a:solidFill>
+              <a:effectLst/>
+              <a:latin typeface="+mn-lt"/>
+              <a:ea typeface="+mn-ea"/>
+              <a:cs typeface="+mn-cs"/>
+            </a:endParaRPr>
+          </a:p>
+          <a:p>
+            <a:endParaRPr lang="en-GB" dirty="0"/>
           </a:p>
         </p:txBody>
       </p:sp>
@@ -744,7 +793,7 @@
           <a:p>
             <a:fld id="{3AB57619-29B7-4E12-9A8A-EA0B06592A0F}" type="slidenum">
               <a:rPr lang="en-GB" smtClean="0"/>
-              <a:t>19</a:t>
+              <a:t>15</a:t>
             </a:fld>
             <a:endParaRPr lang="en-GB"/>
           </a:p>
@@ -753,7 +802,7 @@
     </p:spTree>
     <p:extLst>
       <p:ext uri="{BB962C8B-B14F-4D97-AF65-F5344CB8AC3E}">
-        <p14:creationId xmlns:p14="http://schemas.microsoft.com/office/powerpoint/2010/main" val="2448798184"/>
+        <p14:creationId xmlns:p14="http://schemas.microsoft.com/office/powerpoint/2010/main" val="1485277645"/>
       </p:ext>
     </p:extLst>
   </p:cSld>
@@ -790,12 +839,7 @@
             <p:ph type="sldImg"/>
           </p:nvPr>
         </p:nvSpPr>
-        <p:spPr>
-          <a:xfrm>
-            <a:off x="685800" y="1143000"/>
-            <a:ext cx="5486400" cy="3086100"/>
-          </a:xfrm>
-        </p:spPr>
+        <p:spPr/>
       </p:sp>
       <p:sp>
         <p:nvSpPr>
@@ -814,7 +858,7 @@
           <a:p>
             <a:r>
               <a:rPr lang="en-US" dirty="0"/>
-              <a:t>Cache invalidation is more difficult, but something you need to take into account.</a:t>
+              <a:t>Basic update example</a:t>
             </a:r>
           </a:p>
         </p:txBody>
@@ -836,7 +880,7 @@
           <a:p>
             <a:fld id="{3AB57619-29B7-4E12-9A8A-EA0B06592A0F}" type="slidenum">
               <a:rPr lang="en-GB" smtClean="0"/>
-              <a:t>21</a:t>
+              <a:t>17</a:t>
             </a:fld>
             <a:endParaRPr lang="en-GB"/>
           </a:p>
@@ -845,7 +889,7 @@
     </p:spTree>
     <p:extLst>
       <p:ext uri="{BB962C8B-B14F-4D97-AF65-F5344CB8AC3E}">
-        <p14:creationId xmlns:p14="http://schemas.microsoft.com/office/powerpoint/2010/main" val="1608191994"/>
+        <p14:creationId xmlns:p14="http://schemas.microsoft.com/office/powerpoint/2010/main" val="4107729990"/>
       </p:ext>
     </p:extLst>
   </p:cSld>
@@ -906,8 +950,20 @@
           <a:p>
             <a:r>
               <a:rPr lang="en-US" dirty="0"/>
-              <a:t>Can return full body but must have Content-Location header</a:t>
-            </a:r>
+              <a:t>PUT the change with the whole resource.</a:t>
+            </a:r>
+          </a:p>
+          <a:p>
+            <a:endParaRPr lang="en-US" dirty="0"/>
+          </a:p>
+          <a:p>
+            <a:r>
+              <a:rPr lang="en-US" dirty="0"/>
+              <a:t>Issues …. Not all things can change</a:t>
+            </a:r>
+          </a:p>
+          <a:p>
+            <a:endParaRPr lang="en-US" dirty="0"/>
           </a:p>
         </p:txBody>
       </p:sp>
@@ -928,7 +984,7 @@
           <a:p>
             <a:fld id="{3AB57619-29B7-4E12-9A8A-EA0B06592A0F}" type="slidenum">
               <a:rPr lang="en-GB" smtClean="0"/>
-              <a:t>23</a:t>
+              <a:t>19</a:t>
             </a:fld>
             <a:endParaRPr lang="en-GB"/>
           </a:p>
@@ -937,7 +993,7 @@
     </p:spTree>
     <p:extLst>
       <p:ext uri="{BB962C8B-B14F-4D97-AF65-F5344CB8AC3E}">
-        <p14:creationId xmlns:p14="http://schemas.microsoft.com/office/powerpoint/2010/main" val="2543550601"/>
+        <p14:creationId xmlns:p14="http://schemas.microsoft.com/office/powerpoint/2010/main" val="2448798184"/>
       </p:ext>
     </p:extLst>
   </p:cSld>
@@ -974,12 +1030,7 @@
             <p:ph type="sldImg"/>
           </p:nvPr>
         </p:nvSpPr>
-        <p:spPr>
-          <a:xfrm>
-            <a:off x="685800" y="1143000"/>
-            <a:ext cx="5486400" cy="3086100"/>
-          </a:xfrm>
-        </p:spPr>
+        <p:spPr/>
       </p:sp>
       <p:sp>
         <p:nvSpPr>
@@ -998,7 +1049,7 @@
           <a:p>
             <a:r>
               <a:rPr lang="en-US" dirty="0"/>
-              <a:t>Notice the Content-Type has changed</a:t>
+              <a:t>Response from PUT</a:t>
             </a:r>
           </a:p>
         </p:txBody>
@@ -1020,7 +1071,7 @@
           <a:p>
             <a:fld id="{3AB57619-29B7-4E12-9A8A-EA0B06592A0F}" type="slidenum">
               <a:rPr lang="en-GB" smtClean="0"/>
-              <a:t>24</a:t>
+              <a:t>20</a:t>
             </a:fld>
             <a:endParaRPr lang="en-GB"/>
           </a:p>
@@ -1029,7 +1080,7 @@
     </p:spTree>
     <p:extLst>
       <p:ext uri="{BB962C8B-B14F-4D97-AF65-F5344CB8AC3E}">
-        <p14:creationId xmlns:p14="http://schemas.microsoft.com/office/powerpoint/2010/main" val="1619877942"/>
+        <p14:creationId xmlns:p14="http://schemas.microsoft.com/office/powerpoint/2010/main" val="819600438"/>
       </p:ext>
     </p:extLst>
   </p:cSld>
@@ -1090,13 +1141,7 @@
           <a:p>
             <a:r>
               <a:rPr lang="en-US" dirty="0"/>
-              <a:t>Empty bucket</a:t>
-            </a:r>
-          </a:p>
-          <a:p>
-            <a:r>
-              <a:rPr lang="en-US" dirty="0"/>
-              <a:t>Collection</a:t>
+              <a:t>Cache invalidation is more difficult, but something you need to take into account.</a:t>
             </a:r>
           </a:p>
         </p:txBody>
@@ -1118,7 +1163,7 @@
           <a:p>
             <a:fld id="{3AB57619-29B7-4E12-9A8A-EA0B06592A0F}" type="slidenum">
               <a:rPr lang="en-GB" smtClean="0"/>
-              <a:t>26</a:t>
+              <a:t>21</a:t>
             </a:fld>
             <a:endParaRPr lang="en-GB"/>
           </a:p>
@@ -1127,7 +1172,7 @@
     </p:spTree>
     <p:extLst>
       <p:ext uri="{BB962C8B-B14F-4D97-AF65-F5344CB8AC3E}">
-        <p14:creationId xmlns:p14="http://schemas.microsoft.com/office/powerpoint/2010/main" val="1269765142"/>
+        <p14:creationId xmlns:p14="http://schemas.microsoft.com/office/powerpoint/2010/main" val="1608191994"/>
       </p:ext>
     </p:extLst>
   </p:cSld>
@@ -1164,12 +1209,7 @@
             <p:ph type="sldImg"/>
           </p:nvPr>
         </p:nvSpPr>
-        <p:spPr>
-          <a:xfrm>
-            <a:off x="685800" y="1143000"/>
-            <a:ext cx="5486400" cy="3086100"/>
-          </a:xfrm>
-        </p:spPr>
+        <p:spPr/>
       </p:sp>
       <p:sp>
         <p:nvSpPr>
@@ -1187,20 +1227,14 @@
           <a:lstStyle/>
           <a:p>
             <a:r>
-              <a:rPr lang="en-GB" sz="1200" b="0" i="0" kern="1200" dirty="0">
-                <a:solidFill>
-                  <a:schemeClr val="tx1"/>
-                </a:solidFill>
-                <a:effectLst/>
-                <a:latin typeface="+mn-lt"/>
-                <a:ea typeface="+mn-ea"/>
-                <a:cs typeface="+mn-cs"/>
-              </a:rPr>
-              <a:t>POST just the Task Id to the bucket</a:t>
-            </a:r>
-          </a:p>
-          <a:p>
-            <a:endParaRPr lang="en-GB" dirty="0"/>
+              <a:rPr lang="en-US" dirty="0"/>
+              <a:t>Editable </a:t>
+            </a:r>
+            <a:r>
+              <a:rPr lang="en-US" dirty="0" err="1"/>
+              <a:t>subresource</a:t>
+            </a:r>
+            <a:endParaRPr lang="en-US" dirty="0"/>
           </a:p>
         </p:txBody>
       </p:sp>
@@ -1221,7 +1255,7 @@
           <a:p>
             <a:fld id="{3AB57619-29B7-4E12-9A8A-EA0B06592A0F}" type="slidenum">
               <a:rPr lang="en-GB" smtClean="0"/>
-              <a:t>27</a:t>
+              <a:t>22</a:t>
             </a:fld>
             <a:endParaRPr lang="en-GB"/>
           </a:p>
@@ -1230,7 +1264,7 @@
     </p:spTree>
     <p:extLst>
       <p:ext uri="{BB962C8B-B14F-4D97-AF65-F5344CB8AC3E}">
-        <p14:creationId xmlns:p14="http://schemas.microsoft.com/office/powerpoint/2010/main" val="3996671622"/>
+        <p14:creationId xmlns:p14="http://schemas.microsoft.com/office/powerpoint/2010/main" val="1595307725"/>
       </p:ext>
     </p:extLst>
   </p:cSld>
@@ -1290,20 +1324,9 @@
           <a:lstStyle/>
           <a:p>
             <a:r>
-              <a:rPr lang="en-GB" sz="1200" b="0" i="0" kern="1200" dirty="0">
-                <a:solidFill>
-                  <a:schemeClr val="tx1"/>
-                </a:solidFill>
-                <a:effectLst/>
-                <a:latin typeface="+mn-lt"/>
-                <a:ea typeface="+mn-ea"/>
-                <a:cs typeface="+mn-cs"/>
-              </a:rPr>
-              <a:t>POST the URI or collection of URIs</a:t>
-            </a:r>
-          </a:p>
-          <a:p>
-            <a:endParaRPr lang="en-GB" dirty="0"/>
+              <a:rPr lang="en-US" dirty="0"/>
+              <a:t>Can return full body but must have Content-Location header</a:t>
+            </a:r>
           </a:p>
         </p:txBody>
       </p:sp>
@@ -1324,7 +1347,7 @@
           <a:p>
             <a:fld id="{3AB57619-29B7-4E12-9A8A-EA0B06592A0F}" type="slidenum">
               <a:rPr lang="en-GB" smtClean="0"/>
-              <a:t>28</a:t>
+              <a:t>23</a:t>
             </a:fld>
             <a:endParaRPr lang="en-GB"/>
           </a:p>
@@ -1333,7 +1356,7 @@
     </p:spTree>
     <p:extLst>
       <p:ext uri="{BB962C8B-B14F-4D97-AF65-F5344CB8AC3E}">
-        <p14:creationId xmlns:p14="http://schemas.microsoft.com/office/powerpoint/2010/main" val="4259547607"/>
+        <p14:creationId xmlns:p14="http://schemas.microsoft.com/office/powerpoint/2010/main" val="2543550601"/>
       </p:ext>
     </p:extLst>
   </p:cSld>
@@ -1393,8 +1416,15 @@
           <a:lstStyle/>
           <a:p>
             <a:r>
-              <a:rPr lang="en-GB" dirty="0"/>
-              <a:t>PUT the whole resource to the bucket</a:t>
+              <a:rPr lang="en-US" dirty="0"/>
+              <a:t>PUT to field</a:t>
+            </a:r>
+            <a:br>
+              <a:rPr lang="en-US" dirty="0"/>
+            </a:br>
+            <a:r>
+              <a:rPr lang="en-US" dirty="0"/>
+              <a:t>Notice the Content-Type has changed</a:t>
             </a:r>
           </a:p>
         </p:txBody>
@@ -1416,7 +1446,7 @@
           <a:p>
             <a:fld id="{3AB57619-29B7-4E12-9A8A-EA0B06592A0F}" type="slidenum">
               <a:rPr lang="en-GB" smtClean="0"/>
-              <a:t>29</a:t>
+              <a:t>24</a:t>
             </a:fld>
             <a:endParaRPr lang="en-GB"/>
           </a:p>
@@ -1425,7 +1455,7 @@
     </p:spTree>
     <p:extLst>
       <p:ext uri="{BB962C8B-B14F-4D97-AF65-F5344CB8AC3E}">
-        <p14:creationId xmlns:p14="http://schemas.microsoft.com/office/powerpoint/2010/main" val="590192530"/>
+        <p14:creationId xmlns:p14="http://schemas.microsoft.com/office/powerpoint/2010/main" val="1619877942"/>
       </p:ext>
     </p:extLst>
   </p:cSld>
@@ -1462,7 +1492,12 @@
             <p:ph type="sldImg"/>
           </p:nvPr>
         </p:nvSpPr>
-        <p:spPr/>
+        <p:spPr>
+          <a:xfrm>
+            <a:off x="685800" y="1143000"/>
+            <a:ext cx="5486400" cy="3086100"/>
+          </a:xfrm>
+        </p:spPr>
       </p:sp>
       <p:sp>
         <p:nvSpPr>
@@ -1480,8 +1515,14 @@
           <a:lstStyle/>
           <a:p>
             <a:r>
-              <a:rPr lang="en-GB" dirty="0"/>
-              <a:t>Return links so you know where you can go and what you can do.</a:t>
+              <a:rPr lang="en-US" dirty="0"/>
+              <a:t>Empty bucket</a:t>
+            </a:r>
+          </a:p>
+          <a:p>
+            <a:r>
+              <a:rPr lang="en-US" dirty="0"/>
+              <a:t>Collection</a:t>
             </a:r>
           </a:p>
         </p:txBody>
@@ -1503,7 +1544,7 @@
           <a:p>
             <a:fld id="{3AB57619-29B7-4E12-9A8A-EA0B06592A0F}" type="slidenum">
               <a:rPr lang="en-GB" smtClean="0"/>
-              <a:t>32</a:t>
+              <a:t>26</a:t>
             </a:fld>
             <a:endParaRPr lang="en-GB"/>
           </a:p>
@@ -1512,7 +1553,7 @@
     </p:spTree>
     <p:extLst>
       <p:ext uri="{BB962C8B-B14F-4D97-AF65-F5344CB8AC3E}">
-        <p14:creationId xmlns:p14="http://schemas.microsoft.com/office/powerpoint/2010/main" val="2886367990"/>
+        <p14:creationId xmlns:p14="http://schemas.microsoft.com/office/powerpoint/2010/main" val="1269765142"/>
       </p:ext>
     </p:extLst>
   </p:cSld>
@@ -1572,15 +1613,20 @@
           <a:lstStyle/>
           <a:p>
             <a:r>
-              <a:rPr lang="en-US" dirty="0"/>
-              <a:t>Will users care? </a:t>
-            </a:r>
-          </a:p>
-          <a:p>
-            <a:r>
-              <a:rPr lang="en-US" dirty="0"/>
-              <a:t>What will they do?</a:t>
-            </a:r>
+              <a:rPr lang="en-GB" sz="1200" b="0" i="0" kern="1200" dirty="0">
+                <a:solidFill>
+                  <a:schemeClr val="tx1"/>
+                </a:solidFill>
+                <a:effectLst/>
+                <a:latin typeface="+mn-lt"/>
+                <a:ea typeface="+mn-ea"/>
+                <a:cs typeface="+mn-cs"/>
+              </a:rPr>
+              <a:t>POST just the Task Id to the bucket</a:t>
+            </a:r>
+          </a:p>
+          <a:p>
+            <a:endParaRPr lang="en-GB" dirty="0"/>
           </a:p>
         </p:txBody>
       </p:sp>
@@ -1601,7 +1647,7 @@
           <a:p>
             <a:fld id="{3AB57619-29B7-4E12-9A8A-EA0B06592A0F}" type="slidenum">
               <a:rPr lang="en-GB" smtClean="0"/>
-              <a:t>33</a:t>
+              <a:t>27</a:t>
             </a:fld>
             <a:endParaRPr lang="en-GB"/>
           </a:p>
@@ -1610,7 +1656,7 @@
     </p:spTree>
     <p:extLst>
       <p:ext uri="{BB962C8B-B14F-4D97-AF65-F5344CB8AC3E}">
-        <p14:creationId xmlns:p14="http://schemas.microsoft.com/office/powerpoint/2010/main" val="2668778191"/>
+        <p14:creationId xmlns:p14="http://schemas.microsoft.com/office/powerpoint/2010/main" val="3996671622"/>
       </p:ext>
     </p:extLst>
   </p:cSld>
@@ -1753,34 +1799,21 @@
           <a:bodyPr/>
           <a:lstStyle/>
           <a:p>
-            <a:endParaRPr lang="en-US" dirty="0"/>
-          </a:p>
-          <a:p>
-            <a:r>
-              <a:rPr lang="en-US" dirty="0"/>
-              <a:t>Convert document formats.</a:t>
-            </a:r>
-          </a:p>
-          <a:p>
-            <a:r>
-              <a:rPr lang="en-US" dirty="0"/>
-              <a:t>Process batch</a:t>
-            </a:r>
-          </a:p>
-          <a:p>
-            <a:endParaRPr lang="en-US" dirty="0"/>
-          </a:p>
-          <a:p>
-            <a:r>
-              <a:rPr lang="en-US" dirty="0"/>
-              <a:t>Temporary?</a:t>
-            </a:r>
-          </a:p>
-          <a:p>
-            <a:r>
-              <a:rPr lang="en-US" dirty="0"/>
-              <a:t>How long do we keep the status</a:t>
-            </a:r>
+            <a:r>
+              <a:rPr lang="en-GB" sz="1200" b="0" i="0" kern="1200" dirty="0">
+                <a:solidFill>
+                  <a:schemeClr val="tx1"/>
+                </a:solidFill>
+                <a:effectLst/>
+                <a:latin typeface="+mn-lt"/>
+                <a:ea typeface="+mn-ea"/>
+                <a:cs typeface="+mn-cs"/>
+              </a:rPr>
+              <a:t>POST the URI or collection of URIs</a:t>
+            </a:r>
+          </a:p>
+          <a:p>
+            <a:endParaRPr lang="en-GB" dirty="0"/>
           </a:p>
         </p:txBody>
       </p:sp>
@@ -1801,7 +1834,7 @@
           <a:p>
             <a:fld id="{3AB57619-29B7-4E12-9A8A-EA0B06592A0F}" type="slidenum">
               <a:rPr lang="en-GB" smtClean="0"/>
-              <a:t>34</a:t>
+              <a:t>28</a:t>
             </a:fld>
             <a:endParaRPr lang="en-GB"/>
           </a:p>
@@ -1810,7 +1843,7 @@
     </p:spTree>
     <p:extLst>
       <p:ext uri="{BB962C8B-B14F-4D97-AF65-F5344CB8AC3E}">
-        <p14:creationId xmlns:p14="http://schemas.microsoft.com/office/powerpoint/2010/main" val="1362272415"/>
+        <p14:creationId xmlns:p14="http://schemas.microsoft.com/office/powerpoint/2010/main" val="4259547607"/>
       </p:ext>
     </p:extLst>
   </p:cSld>
@@ -1870,34 +1903,9 @@
           <a:lstStyle/>
           <a:p>
             <a:r>
-              <a:rPr lang="en-GB" sz="1200" b="0" i="0" kern="1200" dirty="0">
-                <a:solidFill>
-                  <a:schemeClr val="tx1"/>
-                </a:solidFill>
-                <a:effectLst/>
-                <a:latin typeface="+mn-lt"/>
-                <a:ea typeface="+mn-ea"/>
-                <a:cs typeface="+mn-cs"/>
-              </a:rPr>
-              <a:t>Should you return the body, doesn’t mean to have to, it’s just recommend</a:t>
-            </a:r>
-          </a:p>
-          <a:p>
-            <a:r>
-              <a:rPr lang="en-GB" sz="1200" b="0" i="0" kern="1200" dirty="0">
-                <a:solidFill>
-                  <a:schemeClr val="tx1"/>
-                </a:solidFill>
-                <a:effectLst/>
-                <a:latin typeface="+mn-lt"/>
-                <a:ea typeface="+mn-ea"/>
-                <a:cs typeface="+mn-cs"/>
-              </a:rPr>
-              <a:t>https://www.w3.org/Protocols/rfc2616/rfc2616-sec10.html#sec10.2.2</a:t>
-            </a:r>
-          </a:p>
-          <a:p>
-            <a:endParaRPr lang="en-GB" dirty="0"/>
+              <a:rPr lang="en-GB" dirty="0"/>
+              <a:t>PUT the whole resource to the bucket</a:t>
+            </a:r>
           </a:p>
         </p:txBody>
       </p:sp>
@@ -1918,7 +1926,7 @@
           <a:p>
             <a:fld id="{3AB57619-29B7-4E12-9A8A-EA0B06592A0F}" type="slidenum">
               <a:rPr lang="en-GB" smtClean="0"/>
-              <a:t>35</a:t>
+              <a:t>29</a:t>
             </a:fld>
             <a:endParaRPr lang="en-GB"/>
           </a:p>
@@ -1927,7 +1935,7 @@
     </p:spTree>
     <p:extLst>
       <p:ext uri="{BB962C8B-B14F-4D97-AF65-F5344CB8AC3E}">
-        <p14:creationId xmlns:p14="http://schemas.microsoft.com/office/powerpoint/2010/main" val="3752846599"/>
+        <p14:creationId xmlns:p14="http://schemas.microsoft.com/office/powerpoint/2010/main" val="590192530"/>
       </p:ext>
     </p:extLst>
   </p:cSld>
@@ -1982,8 +1990,8 @@
           <a:lstStyle/>
           <a:p>
             <a:r>
-              <a:rPr lang="en-US" dirty="0"/>
-              <a:t>We be polling, polling, polling</a:t>
+              <a:rPr lang="en-GB" dirty="0"/>
+              <a:t>Return links so you know where you can go and what you can do.</a:t>
             </a:r>
           </a:p>
         </p:txBody>
@@ -2005,7 +2013,7 @@
           <a:p>
             <a:fld id="{3AB57619-29B7-4E12-9A8A-EA0B06592A0F}" type="slidenum">
               <a:rPr lang="en-GB" smtClean="0"/>
-              <a:t>36</a:t>
+              <a:t>32</a:t>
             </a:fld>
             <a:endParaRPr lang="en-GB"/>
           </a:p>
@@ -2014,7 +2022,7 @@
     </p:spTree>
     <p:extLst>
       <p:ext uri="{BB962C8B-B14F-4D97-AF65-F5344CB8AC3E}">
-        <p14:creationId xmlns:p14="http://schemas.microsoft.com/office/powerpoint/2010/main" val="2976161276"/>
+        <p14:creationId xmlns:p14="http://schemas.microsoft.com/office/powerpoint/2010/main" val="2886367990"/>
       </p:ext>
     </p:extLst>
   </p:cSld>
@@ -2074,34 +2082,15 @@
           <a:lstStyle/>
           <a:p>
             <a:r>
-              <a:rPr lang="en-GB" sz="1200" b="0" i="0" kern="1200" dirty="0">
-                <a:solidFill>
-                  <a:schemeClr val="tx1"/>
-                </a:solidFill>
-                <a:effectLst/>
-                <a:latin typeface="+mn-lt"/>
-                <a:ea typeface="+mn-ea"/>
-                <a:cs typeface="+mn-cs"/>
-              </a:rPr>
-              <a:t>Should you return the body</a:t>
-            </a:r>
-          </a:p>
-          <a:p>
-            <a:r>
-              <a:rPr lang="en-GB" sz="1200" b="0" i="0" kern="1200" dirty="0">
-                <a:solidFill>
-                  <a:schemeClr val="tx1"/>
-                </a:solidFill>
-                <a:effectLst/>
-                <a:latin typeface="+mn-lt"/>
-                <a:ea typeface="+mn-ea"/>
-                <a:cs typeface="+mn-cs"/>
-              </a:rPr>
-              <a:t>https://www.w3.org/Protocols/rfc2616/rfc2616-sec10.html#sec10.2.2</a:t>
-            </a:r>
-          </a:p>
-          <a:p>
-            <a:endParaRPr lang="en-GB" dirty="0"/>
+              <a:rPr lang="en-US" dirty="0"/>
+              <a:t>Will users care? </a:t>
+            </a:r>
+          </a:p>
+          <a:p>
+            <a:r>
+              <a:rPr lang="en-US" dirty="0"/>
+              <a:t>What will they do?</a:t>
+            </a:r>
           </a:p>
         </p:txBody>
       </p:sp>
@@ -2122,7 +2111,7 @@
           <a:p>
             <a:fld id="{3AB57619-29B7-4E12-9A8A-EA0B06592A0F}" type="slidenum">
               <a:rPr lang="en-GB" smtClean="0"/>
-              <a:t>39</a:t>
+              <a:t>33</a:t>
             </a:fld>
             <a:endParaRPr lang="en-GB"/>
           </a:p>
@@ -2131,7 +2120,7 @@
     </p:spTree>
     <p:extLst>
       <p:ext uri="{BB962C8B-B14F-4D97-AF65-F5344CB8AC3E}">
-        <p14:creationId xmlns:p14="http://schemas.microsoft.com/office/powerpoint/2010/main" val="2831759968"/>
+        <p14:creationId xmlns:p14="http://schemas.microsoft.com/office/powerpoint/2010/main" val="2668778191"/>
       </p:ext>
     </p:extLst>
   </p:cSld>
@@ -2168,7 +2157,12 @@
             <p:ph type="sldImg"/>
           </p:nvPr>
         </p:nvSpPr>
-        <p:spPr/>
+        <p:spPr>
+          <a:xfrm>
+            <a:off x="685800" y="1143000"/>
+            <a:ext cx="5486400" cy="3086100"/>
+          </a:xfrm>
+        </p:spPr>
       </p:sp>
       <p:sp>
         <p:nvSpPr>
@@ -2185,15 +2179,34 @@
           <a:bodyPr/>
           <a:lstStyle/>
           <a:p>
-            <a:r>
-              <a:rPr lang="en-GB" dirty="0"/>
-              <a:t>In </a:t>
-            </a:r>
-            <a:r>
-              <a:rPr lang="en-GB" dirty="0" err="1"/>
-              <a:t>progess</a:t>
-            </a:r>
-            <a:endParaRPr lang="en-GB" dirty="0"/>
+            <a:endParaRPr lang="en-US" dirty="0"/>
+          </a:p>
+          <a:p>
+            <a:r>
+              <a:rPr lang="en-US" dirty="0"/>
+              <a:t>Convert document formats.</a:t>
+            </a:r>
+          </a:p>
+          <a:p>
+            <a:r>
+              <a:rPr lang="en-US" dirty="0"/>
+              <a:t>Process batch</a:t>
+            </a:r>
+          </a:p>
+          <a:p>
+            <a:endParaRPr lang="en-US" dirty="0"/>
+          </a:p>
+          <a:p>
+            <a:r>
+              <a:rPr lang="en-US" dirty="0"/>
+              <a:t>Temporary?</a:t>
+            </a:r>
+          </a:p>
+          <a:p>
+            <a:r>
+              <a:rPr lang="en-US" dirty="0"/>
+              <a:t>How long do we keep the status</a:t>
+            </a:r>
           </a:p>
         </p:txBody>
       </p:sp>
@@ -2214,7 +2227,7 @@
           <a:p>
             <a:fld id="{3AB57619-29B7-4E12-9A8A-EA0B06592A0F}" type="slidenum">
               <a:rPr lang="en-GB" smtClean="0"/>
-              <a:t>40</a:t>
+              <a:t>34</a:t>
             </a:fld>
             <a:endParaRPr lang="en-GB"/>
           </a:p>
@@ -2223,7 +2236,7 @@
     </p:spTree>
     <p:extLst>
       <p:ext uri="{BB962C8B-B14F-4D97-AF65-F5344CB8AC3E}">
-        <p14:creationId xmlns:p14="http://schemas.microsoft.com/office/powerpoint/2010/main" val="3973604286"/>
+        <p14:creationId xmlns:p14="http://schemas.microsoft.com/office/powerpoint/2010/main" val="1362272415"/>
       </p:ext>
     </p:extLst>
   </p:cSld>
@@ -2260,7 +2273,12 @@
             <p:ph type="sldImg"/>
           </p:nvPr>
         </p:nvSpPr>
-        <p:spPr/>
+        <p:spPr>
+          <a:xfrm>
+            <a:off x="685800" y="1143000"/>
+            <a:ext cx="5486400" cy="3086100"/>
+          </a:xfrm>
+        </p:spPr>
       </p:sp>
       <p:sp>
         <p:nvSpPr>
@@ -2278,9 +2296,34 @@
           <a:lstStyle/>
           <a:p>
             <a:r>
-              <a:rPr lang="en-GB" dirty="0"/>
-              <a:t>Link to task in header</a:t>
-            </a:r>
+              <a:rPr lang="en-GB" sz="1200" b="0" i="0" kern="1200" dirty="0">
+                <a:solidFill>
+                  <a:schemeClr val="tx1"/>
+                </a:solidFill>
+                <a:effectLst/>
+                <a:latin typeface="+mn-lt"/>
+                <a:ea typeface="+mn-ea"/>
+                <a:cs typeface="+mn-cs"/>
+              </a:rPr>
+              <a:t>Should you return the body, doesn’t mean to have to, it’s just recommend</a:t>
+            </a:r>
+          </a:p>
+          <a:p>
+            <a:r>
+              <a:rPr lang="en-GB" sz="1200" b="0" i="0" kern="1200" dirty="0">
+                <a:solidFill>
+                  <a:schemeClr val="tx1"/>
+                </a:solidFill>
+                <a:effectLst/>
+                <a:latin typeface="+mn-lt"/>
+                <a:ea typeface="+mn-ea"/>
+                <a:cs typeface="+mn-cs"/>
+              </a:rPr>
+              <a:t>https://www.w3.org/Protocols/rfc2616/rfc2616-sec10.html#sec10.2.2</a:t>
+            </a:r>
+          </a:p>
+          <a:p>
+            <a:endParaRPr lang="en-GB" dirty="0"/>
           </a:p>
         </p:txBody>
       </p:sp>
@@ -2301,7 +2344,7 @@
           <a:p>
             <a:fld id="{3AB57619-29B7-4E12-9A8A-EA0B06592A0F}" type="slidenum">
               <a:rPr lang="en-GB" smtClean="0"/>
-              <a:t>41</a:t>
+              <a:t>35</a:t>
             </a:fld>
             <a:endParaRPr lang="en-GB"/>
           </a:p>
@@ -2310,7 +2353,7 @@
     </p:spTree>
     <p:extLst>
       <p:ext uri="{BB962C8B-B14F-4D97-AF65-F5344CB8AC3E}">
-        <p14:creationId xmlns:p14="http://schemas.microsoft.com/office/powerpoint/2010/main" val="3751793783"/>
+        <p14:creationId xmlns:p14="http://schemas.microsoft.com/office/powerpoint/2010/main" val="3752846599"/>
       </p:ext>
     </p:extLst>
   </p:cSld>
@@ -2365,8 +2408,8 @@
           <a:lstStyle/>
           <a:p>
             <a:r>
-              <a:rPr lang="en-GB" dirty="0"/>
-              <a:t>Or do it in the body or both!</a:t>
+              <a:rPr lang="en-US" dirty="0"/>
+              <a:t>We be polling, polling, polling</a:t>
             </a:r>
           </a:p>
         </p:txBody>
@@ -2388,7 +2431,7 @@
           <a:p>
             <a:fld id="{3AB57619-29B7-4E12-9A8A-EA0B06592A0F}" type="slidenum">
               <a:rPr lang="en-GB" smtClean="0"/>
-              <a:t>42</a:t>
+              <a:t>36</a:t>
             </a:fld>
             <a:endParaRPr lang="en-GB"/>
           </a:p>
@@ -2397,7 +2440,7 @@
     </p:spTree>
     <p:extLst>
       <p:ext uri="{BB962C8B-B14F-4D97-AF65-F5344CB8AC3E}">
-        <p14:creationId xmlns:p14="http://schemas.microsoft.com/office/powerpoint/2010/main" val="1078481724"/>
+        <p14:creationId xmlns:p14="http://schemas.microsoft.com/office/powerpoint/2010/main" val="2976161276"/>
       </p:ext>
     </p:extLst>
   </p:cSld>
@@ -2505,7 +2548,7 @@
           <a:p>
             <a:fld id="{3AB57619-29B7-4E12-9A8A-EA0B06592A0F}" type="slidenum">
               <a:rPr lang="en-GB" smtClean="0"/>
-              <a:t>44</a:t>
+              <a:t>39</a:t>
             </a:fld>
             <a:endParaRPr lang="en-GB"/>
           </a:p>
@@ -2514,7 +2557,7 @@
     </p:spTree>
     <p:extLst>
       <p:ext uri="{BB962C8B-B14F-4D97-AF65-F5344CB8AC3E}">
-        <p14:creationId xmlns:p14="http://schemas.microsoft.com/office/powerpoint/2010/main" val="327322135"/>
+        <p14:creationId xmlns:p14="http://schemas.microsoft.com/office/powerpoint/2010/main" val="2831759968"/>
       </p:ext>
     </p:extLst>
   </p:cSld>
@@ -2551,12 +2594,7 @@
             <p:ph type="sldImg"/>
           </p:nvPr>
         </p:nvSpPr>
-        <p:spPr>
-          <a:xfrm>
-            <a:off x="685800" y="1143000"/>
-            <a:ext cx="5486400" cy="3086100"/>
-          </a:xfrm>
-        </p:spPr>
+        <p:spPr/>
       </p:sp>
       <p:sp>
         <p:nvSpPr>
@@ -2574,17 +2612,14 @@
           <a:lstStyle/>
           <a:p>
             <a:r>
-              <a:rPr lang="en-US" dirty="0"/>
-              <a:t>https://</a:t>
-            </a:r>
-            <a:r>
-              <a:rPr lang="en-US" dirty="0" err="1"/>
-              <a:t>tools.ietf.org</a:t>
-            </a:r>
-            <a:r>
-              <a:rPr lang="en-US" dirty="0"/>
-              <a:t>/html/draft-nottingham-json-home-02</a:t>
-            </a:r>
+              <a:rPr lang="en-GB" dirty="0"/>
+              <a:t>In </a:t>
+            </a:r>
+            <a:r>
+              <a:rPr lang="en-GB" dirty="0" err="1"/>
+              <a:t>progess</a:t>
+            </a:r>
+            <a:endParaRPr lang="en-GB" dirty="0"/>
           </a:p>
         </p:txBody>
       </p:sp>
@@ -2605,7 +2640,7 @@
           <a:p>
             <a:fld id="{3AB57619-29B7-4E12-9A8A-EA0B06592A0F}" type="slidenum">
               <a:rPr lang="en-GB" smtClean="0"/>
-              <a:t>46</a:t>
+              <a:t>40</a:t>
             </a:fld>
             <a:endParaRPr lang="en-GB"/>
           </a:p>
@@ -2614,7 +2649,7 @@
     </p:spTree>
     <p:extLst>
       <p:ext uri="{BB962C8B-B14F-4D97-AF65-F5344CB8AC3E}">
-        <p14:creationId xmlns:p14="http://schemas.microsoft.com/office/powerpoint/2010/main" val="4000050960"/>
+        <p14:creationId xmlns:p14="http://schemas.microsoft.com/office/powerpoint/2010/main" val="3973604286"/>
       </p:ext>
     </p:extLst>
   </p:cSld>
@@ -2651,12 +2686,7 @@
             <p:ph type="sldImg"/>
           </p:nvPr>
         </p:nvSpPr>
-        <p:spPr>
-          <a:xfrm>
-            <a:off x="685800" y="1143000"/>
-            <a:ext cx="5486400" cy="3086100"/>
-          </a:xfrm>
-        </p:spPr>
+        <p:spPr/>
       </p:sp>
       <p:sp>
         <p:nvSpPr>
@@ -2673,7 +2703,10 @@
           <a:bodyPr/>
           <a:lstStyle/>
           <a:p>
-            <a:endParaRPr lang="en-US" dirty="0"/>
+            <a:r>
+              <a:rPr lang="en-GB" dirty="0"/>
+              <a:t>Link to task in header</a:t>
+            </a:r>
           </a:p>
         </p:txBody>
       </p:sp>
@@ -2694,7 +2727,7 @@
           <a:p>
             <a:fld id="{3AB57619-29B7-4E12-9A8A-EA0B06592A0F}" type="slidenum">
               <a:rPr lang="en-GB" smtClean="0"/>
-              <a:t>47</a:t>
+              <a:t>41</a:t>
             </a:fld>
             <a:endParaRPr lang="en-GB"/>
           </a:p>
@@ -2703,7 +2736,7 @@
     </p:spTree>
     <p:extLst>
       <p:ext uri="{BB962C8B-B14F-4D97-AF65-F5344CB8AC3E}">
-        <p14:creationId xmlns:p14="http://schemas.microsoft.com/office/powerpoint/2010/main" val="3398987073"/>
+        <p14:creationId xmlns:p14="http://schemas.microsoft.com/office/powerpoint/2010/main" val="3751793783"/>
       </p:ext>
     </p:extLst>
   </p:cSld>
@@ -2881,7 +2914,7 @@
           <a:p>
             <a:r>
               <a:rPr lang="en-GB" dirty="0"/>
-              <a:t>Resource manager</a:t>
+              <a:t>Or do it in the body or both!</a:t>
             </a:r>
           </a:p>
         </p:txBody>
@@ -2903,7 +2936,7 @@
           <a:p>
             <a:fld id="{3AB57619-29B7-4E12-9A8A-EA0B06592A0F}" type="slidenum">
               <a:rPr lang="en-GB" smtClean="0"/>
-              <a:t>48</a:t>
+              <a:t>42</a:t>
             </a:fld>
             <a:endParaRPr lang="en-GB"/>
           </a:p>
@@ -2912,7 +2945,7 @@
     </p:spTree>
     <p:extLst>
       <p:ext uri="{BB962C8B-B14F-4D97-AF65-F5344CB8AC3E}">
-        <p14:creationId xmlns:p14="http://schemas.microsoft.com/office/powerpoint/2010/main" val="1146524281"/>
+        <p14:creationId xmlns:p14="http://schemas.microsoft.com/office/powerpoint/2010/main" val="1078481724"/>
       </p:ext>
     </p:extLst>
   </p:cSld>
@@ -2972,72 +3005,34 @@
           <a:lstStyle/>
           <a:p>
             <a:r>
-              <a:rPr lang="en-US" dirty="0"/>
-              <a:t>Could take parameters</a:t>
-            </a:r>
-          </a:p>
-          <a:p>
-            <a:r>
-              <a:rPr lang="en-US" dirty="0"/>
-              <a:t>GET could return </a:t>
-            </a:r>
-            <a:r>
-              <a:rPr lang="en-US" dirty="0" err="1"/>
-              <a:t>params</a:t>
-            </a:r>
-            <a:endParaRPr lang="en-US" dirty="0"/>
-          </a:p>
-          <a:p>
-            <a:endParaRPr lang="en-US" dirty="0"/>
-          </a:p>
-          <a:p>
-            <a:r>
-              <a:rPr lang="en-US" dirty="0"/>
-              <a:t>Could return the body with Content-Location</a:t>
-            </a:r>
-          </a:p>
-          <a:p>
-            <a:endParaRPr lang="en-US" dirty="0"/>
-          </a:p>
-          <a:p>
-            <a:r>
-              <a:rPr lang="en-US" dirty="0"/>
-              <a:t>Body of the post does not have to be related to the resource that is created!!!</a:t>
-            </a:r>
-          </a:p>
-          <a:p>
-            <a:endParaRPr lang="en-US" dirty="0"/>
-          </a:p>
-          <a:p>
-            <a:r>
-              <a:rPr lang="en-US" dirty="0"/>
-              <a:t>The factory </a:t>
-            </a:r>
-            <a:r>
-              <a:rPr lang="en-US" dirty="0" err="1"/>
-              <a:t>uri</a:t>
-            </a:r>
-            <a:r>
-              <a:rPr lang="en-US" dirty="0"/>
-              <a:t> does not have related to the newly created </a:t>
-            </a:r>
-            <a:r>
-              <a:rPr lang="en-US" dirty="0" err="1"/>
-              <a:t>uri</a:t>
-            </a:r>
-            <a:r>
-              <a:rPr lang="en-US" dirty="0"/>
-              <a:t>.</a:t>
-            </a:r>
-          </a:p>
-          <a:p>
-            <a:endParaRPr lang="en-US" dirty="0"/>
-          </a:p>
-          <a:p>
-            <a:r>
-              <a:rPr lang="en-US" dirty="0"/>
-              <a:t>The factory is generally the collection</a:t>
-            </a:r>
+              <a:rPr lang="en-GB" sz="1200" b="0" i="0" kern="1200" dirty="0">
+                <a:solidFill>
+                  <a:schemeClr val="tx1"/>
+                </a:solidFill>
+                <a:effectLst/>
+                <a:latin typeface="+mn-lt"/>
+                <a:ea typeface="+mn-ea"/>
+                <a:cs typeface="+mn-cs"/>
+              </a:rPr>
+              <a:t>Should you return the body</a:t>
+            </a:r>
+          </a:p>
+          <a:p>
+            <a:r>
+              <a:rPr lang="en-GB" sz="1200" b="0" i="0" kern="1200" dirty="0">
+                <a:solidFill>
+                  <a:schemeClr val="tx1"/>
+                </a:solidFill>
+                <a:effectLst/>
+                <a:latin typeface="+mn-lt"/>
+                <a:ea typeface="+mn-ea"/>
+                <a:cs typeface="+mn-cs"/>
+              </a:rPr>
+              <a:t>https://www.w3.org/Protocols/rfc2616/rfc2616-sec10.html#sec10.2.2</a:t>
+            </a:r>
+          </a:p>
+          <a:p>
+            <a:endParaRPr lang="en-GB" dirty="0"/>
           </a:p>
         </p:txBody>
       </p:sp>
@@ -3058,7 +3053,7 @@
           <a:p>
             <a:fld id="{3AB57619-29B7-4E12-9A8A-EA0B06592A0F}" type="slidenum">
               <a:rPr lang="en-GB" smtClean="0"/>
-              <a:t>49</a:t>
+              <a:t>44</a:t>
             </a:fld>
             <a:endParaRPr lang="en-GB"/>
           </a:p>
@@ -3067,7 +3062,7 @@
     </p:spTree>
     <p:extLst>
       <p:ext uri="{BB962C8B-B14F-4D97-AF65-F5344CB8AC3E}">
-        <p14:creationId xmlns:p14="http://schemas.microsoft.com/office/powerpoint/2010/main" val="2644051961"/>
+        <p14:creationId xmlns:p14="http://schemas.microsoft.com/office/powerpoint/2010/main" val="327322135"/>
       </p:ext>
     </p:extLst>
   </p:cSld>
@@ -3136,7 +3131,7 @@
             </a:r>
             <a:r>
               <a:rPr lang="en-US" dirty="0"/>
-              <a:t>/html/rfc7232#section-3.3</a:t>
+              <a:t>/html/draft-nottingham-json-home-02</a:t>
             </a:r>
           </a:p>
         </p:txBody>
@@ -3158,7 +3153,7 @@
           <a:p>
             <a:fld id="{3AB57619-29B7-4E12-9A8A-EA0B06592A0F}" type="slidenum">
               <a:rPr lang="en-GB" smtClean="0"/>
-              <a:t>50</a:t>
+              <a:t>46</a:t>
             </a:fld>
             <a:endParaRPr lang="en-GB"/>
           </a:p>
@@ -3167,7 +3162,7 @@
     </p:spTree>
     <p:extLst>
       <p:ext uri="{BB962C8B-B14F-4D97-AF65-F5344CB8AC3E}">
-        <p14:creationId xmlns:p14="http://schemas.microsoft.com/office/powerpoint/2010/main" val="3517390849"/>
+        <p14:creationId xmlns:p14="http://schemas.microsoft.com/office/powerpoint/2010/main" val="4000050960"/>
       </p:ext>
     </p:extLst>
   </p:cSld>
@@ -3204,7 +3199,12 @@
             <p:ph type="sldImg"/>
           </p:nvPr>
         </p:nvSpPr>
-        <p:spPr/>
+        <p:spPr>
+          <a:xfrm>
+            <a:off x="685800" y="1143000"/>
+            <a:ext cx="5486400" cy="3086100"/>
+          </a:xfrm>
+        </p:spPr>
       </p:sp>
       <p:sp>
         <p:nvSpPr>
@@ -3221,24 +3221,7 @@
           <a:bodyPr/>
           <a:lstStyle/>
           <a:p>
-            <a:r>
-              <a:rPr lang="en-GB" dirty="0"/>
-              <a:t>Last modified, great for server side caching.</a:t>
-            </a:r>
-          </a:p>
-          <a:p>
-            <a:r>
-              <a:rPr lang="en-GB" dirty="0"/>
-              <a:t>Helps remove calls to the DB, stick the date and </a:t>
-            </a:r>
-            <a:r>
-              <a:rPr lang="en-GB" dirty="0" err="1"/>
-              <a:t>recource</a:t>
-            </a:r>
-            <a:r>
-              <a:rPr lang="en-GB" dirty="0"/>
-              <a:t> id in Redis or something like that</a:t>
-            </a:r>
+            <a:endParaRPr lang="en-US" dirty="0"/>
           </a:p>
         </p:txBody>
       </p:sp>
@@ -3259,7 +3242,7 @@
           <a:p>
             <a:fld id="{3AB57619-29B7-4E12-9A8A-EA0B06592A0F}" type="slidenum">
               <a:rPr lang="en-GB" smtClean="0"/>
-              <a:t>51</a:t>
+              <a:t>47</a:t>
             </a:fld>
             <a:endParaRPr lang="en-GB"/>
           </a:p>
@@ -3268,7 +3251,7 @@
     </p:spTree>
     <p:extLst>
       <p:ext uri="{BB962C8B-B14F-4D97-AF65-F5344CB8AC3E}">
-        <p14:creationId xmlns:p14="http://schemas.microsoft.com/office/powerpoint/2010/main" val="4260130333"/>
+        <p14:creationId xmlns:p14="http://schemas.microsoft.com/office/powerpoint/2010/main" val="3398987073"/>
       </p:ext>
     </p:extLst>
   </p:cSld>
@@ -3322,6 +3305,449 @@
           <a:bodyPr/>
           <a:lstStyle/>
           <a:p>
+            <a:r>
+              <a:rPr lang="en-GB" dirty="0"/>
+              <a:t>Resource manager</a:t>
+            </a:r>
+          </a:p>
+        </p:txBody>
+      </p:sp>
+      <p:sp>
+        <p:nvSpPr>
+          <p:cNvPr id="4" name="Slide Number Placeholder 3"/>
+          <p:cNvSpPr>
+            <a:spLocks noGrp="1"/>
+          </p:cNvSpPr>
+          <p:nvPr>
+            <p:ph type="sldNum" sz="quarter" idx="5"/>
+          </p:nvPr>
+        </p:nvSpPr>
+        <p:spPr/>
+        <p:txBody>
+          <a:bodyPr/>
+          <a:lstStyle/>
+          <a:p>
+            <a:fld id="{3AB57619-29B7-4E12-9A8A-EA0B06592A0F}" type="slidenum">
+              <a:rPr lang="en-GB" smtClean="0"/>
+              <a:t>48</a:t>
+            </a:fld>
+            <a:endParaRPr lang="en-GB"/>
+          </a:p>
+        </p:txBody>
+      </p:sp>
+    </p:spTree>
+    <p:extLst>
+      <p:ext uri="{BB962C8B-B14F-4D97-AF65-F5344CB8AC3E}">
+        <p14:creationId xmlns:p14="http://schemas.microsoft.com/office/powerpoint/2010/main" val="1146524281"/>
+      </p:ext>
+    </p:extLst>
+  </p:cSld>
+  <p:clrMapOvr>
+    <a:masterClrMapping/>
+  </p:clrMapOvr>
+</p:notes>
+</file>
+
+<file path=ppt/notesSlides/notesSlide35.xml><?xml version="1.0" encoding="utf-8"?>
+<p:notes xmlns:a="http://schemas.openxmlformats.org/drawingml/2006/main" xmlns:r="http://schemas.openxmlformats.org/officeDocument/2006/relationships" xmlns:p="http://schemas.openxmlformats.org/presentationml/2006/main">
+  <p:cSld>
+    <p:spTree>
+      <p:nvGrpSpPr>
+        <p:cNvPr id="1" name=""/>
+        <p:cNvGrpSpPr/>
+        <p:nvPr/>
+      </p:nvGrpSpPr>
+      <p:grpSpPr>
+        <a:xfrm>
+          <a:off x="0" y="0"/>
+          <a:ext cx="0" cy="0"/>
+          <a:chOff x="0" y="0"/>
+          <a:chExt cx="0" cy="0"/>
+        </a:xfrm>
+      </p:grpSpPr>
+      <p:sp>
+        <p:nvSpPr>
+          <p:cNvPr id="2" name="Slide Image Placeholder 1"/>
+          <p:cNvSpPr>
+            <a:spLocks noGrp="1" noRot="1" noChangeAspect="1"/>
+          </p:cNvSpPr>
+          <p:nvPr>
+            <p:ph type="sldImg"/>
+          </p:nvPr>
+        </p:nvSpPr>
+        <p:spPr>
+          <a:xfrm>
+            <a:off x="685800" y="1143000"/>
+            <a:ext cx="5486400" cy="3086100"/>
+          </a:xfrm>
+        </p:spPr>
+      </p:sp>
+      <p:sp>
+        <p:nvSpPr>
+          <p:cNvPr id="3" name="Notes Placeholder 2"/>
+          <p:cNvSpPr>
+            <a:spLocks noGrp="1"/>
+          </p:cNvSpPr>
+          <p:nvPr>
+            <p:ph type="body" idx="1"/>
+          </p:nvPr>
+        </p:nvSpPr>
+        <p:spPr/>
+        <p:txBody>
+          <a:bodyPr/>
+          <a:lstStyle/>
+          <a:p>
+            <a:r>
+              <a:rPr lang="en-US" dirty="0"/>
+              <a:t>Could take parameters</a:t>
+            </a:r>
+          </a:p>
+          <a:p>
+            <a:r>
+              <a:rPr lang="en-US" dirty="0"/>
+              <a:t>GET could return </a:t>
+            </a:r>
+            <a:r>
+              <a:rPr lang="en-US" dirty="0" err="1"/>
+              <a:t>params</a:t>
+            </a:r>
+            <a:endParaRPr lang="en-US" dirty="0"/>
+          </a:p>
+          <a:p>
+            <a:endParaRPr lang="en-US" dirty="0"/>
+          </a:p>
+          <a:p>
+            <a:r>
+              <a:rPr lang="en-US" dirty="0"/>
+              <a:t>Could return the body with Content-Location</a:t>
+            </a:r>
+          </a:p>
+          <a:p>
+            <a:endParaRPr lang="en-US" dirty="0"/>
+          </a:p>
+          <a:p>
+            <a:r>
+              <a:rPr lang="en-US" dirty="0"/>
+              <a:t>Body of the post does not have to be related to the resource that is created!!!</a:t>
+            </a:r>
+          </a:p>
+          <a:p>
+            <a:endParaRPr lang="en-US" dirty="0"/>
+          </a:p>
+          <a:p>
+            <a:r>
+              <a:rPr lang="en-US" dirty="0"/>
+              <a:t>The factory </a:t>
+            </a:r>
+            <a:r>
+              <a:rPr lang="en-US" dirty="0" err="1"/>
+              <a:t>uri</a:t>
+            </a:r>
+            <a:r>
+              <a:rPr lang="en-US" dirty="0"/>
+              <a:t> does not have related to the newly created </a:t>
+            </a:r>
+            <a:r>
+              <a:rPr lang="en-US" dirty="0" err="1"/>
+              <a:t>uri</a:t>
+            </a:r>
+            <a:r>
+              <a:rPr lang="en-US" dirty="0"/>
+              <a:t>.</a:t>
+            </a:r>
+          </a:p>
+          <a:p>
+            <a:endParaRPr lang="en-US" dirty="0"/>
+          </a:p>
+          <a:p>
+            <a:r>
+              <a:rPr lang="en-US" dirty="0"/>
+              <a:t>The factory is generally the collection</a:t>
+            </a:r>
+          </a:p>
+        </p:txBody>
+      </p:sp>
+      <p:sp>
+        <p:nvSpPr>
+          <p:cNvPr id="4" name="Slide Number Placeholder 3"/>
+          <p:cNvSpPr>
+            <a:spLocks noGrp="1"/>
+          </p:cNvSpPr>
+          <p:nvPr>
+            <p:ph type="sldNum" sz="quarter" idx="5"/>
+          </p:nvPr>
+        </p:nvSpPr>
+        <p:spPr/>
+        <p:txBody>
+          <a:bodyPr/>
+          <a:lstStyle/>
+          <a:p>
+            <a:fld id="{3AB57619-29B7-4E12-9A8A-EA0B06592A0F}" type="slidenum">
+              <a:rPr lang="en-GB" smtClean="0"/>
+              <a:t>49</a:t>
+            </a:fld>
+            <a:endParaRPr lang="en-GB"/>
+          </a:p>
+        </p:txBody>
+      </p:sp>
+    </p:spTree>
+    <p:extLst>
+      <p:ext uri="{BB962C8B-B14F-4D97-AF65-F5344CB8AC3E}">
+        <p14:creationId xmlns:p14="http://schemas.microsoft.com/office/powerpoint/2010/main" val="2644051961"/>
+      </p:ext>
+    </p:extLst>
+  </p:cSld>
+  <p:clrMapOvr>
+    <a:masterClrMapping/>
+  </p:clrMapOvr>
+</p:notes>
+</file>
+
+<file path=ppt/notesSlides/notesSlide36.xml><?xml version="1.0" encoding="utf-8"?>
+<p:notes xmlns:a="http://schemas.openxmlformats.org/drawingml/2006/main" xmlns:r="http://schemas.openxmlformats.org/officeDocument/2006/relationships" xmlns:p="http://schemas.openxmlformats.org/presentationml/2006/main">
+  <p:cSld>
+    <p:spTree>
+      <p:nvGrpSpPr>
+        <p:cNvPr id="1" name=""/>
+        <p:cNvGrpSpPr/>
+        <p:nvPr/>
+      </p:nvGrpSpPr>
+      <p:grpSpPr>
+        <a:xfrm>
+          <a:off x="0" y="0"/>
+          <a:ext cx="0" cy="0"/>
+          <a:chOff x="0" y="0"/>
+          <a:chExt cx="0" cy="0"/>
+        </a:xfrm>
+      </p:grpSpPr>
+      <p:sp>
+        <p:nvSpPr>
+          <p:cNvPr id="2" name="Slide Image Placeholder 1"/>
+          <p:cNvSpPr>
+            <a:spLocks noGrp="1" noRot="1" noChangeAspect="1"/>
+          </p:cNvSpPr>
+          <p:nvPr>
+            <p:ph type="sldImg"/>
+          </p:nvPr>
+        </p:nvSpPr>
+        <p:spPr>
+          <a:xfrm>
+            <a:off x="685800" y="1143000"/>
+            <a:ext cx="5486400" cy="3086100"/>
+          </a:xfrm>
+        </p:spPr>
+      </p:sp>
+      <p:sp>
+        <p:nvSpPr>
+          <p:cNvPr id="3" name="Notes Placeholder 2"/>
+          <p:cNvSpPr>
+            <a:spLocks noGrp="1"/>
+          </p:cNvSpPr>
+          <p:nvPr>
+            <p:ph type="body" idx="1"/>
+          </p:nvPr>
+        </p:nvSpPr>
+        <p:spPr/>
+        <p:txBody>
+          <a:bodyPr/>
+          <a:lstStyle/>
+          <a:p>
+            <a:r>
+              <a:rPr lang="en-US" dirty="0"/>
+              <a:t>https://</a:t>
+            </a:r>
+            <a:r>
+              <a:rPr lang="en-US" dirty="0" err="1"/>
+              <a:t>tools.ietf.org</a:t>
+            </a:r>
+            <a:r>
+              <a:rPr lang="en-US" dirty="0"/>
+              <a:t>/html/rfc7232#section-3.3</a:t>
+            </a:r>
+          </a:p>
+        </p:txBody>
+      </p:sp>
+      <p:sp>
+        <p:nvSpPr>
+          <p:cNvPr id="4" name="Slide Number Placeholder 3"/>
+          <p:cNvSpPr>
+            <a:spLocks noGrp="1"/>
+          </p:cNvSpPr>
+          <p:nvPr>
+            <p:ph type="sldNum" sz="quarter" idx="5"/>
+          </p:nvPr>
+        </p:nvSpPr>
+        <p:spPr/>
+        <p:txBody>
+          <a:bodyPr/>
+          <a:lstStyle/>
+          <a:p>
+            <a:fld id="{3AB57619-29B7-4E12-9A8A-EA0B06592A0F}" type="slidenum">
+              <a:rPr lang="en-GB" smtClean="0"/>
+              <a:t>50</a:t>
+            </a:fld>
+            <a:endParaRPr lang="en-GB"/>
+          </a:p>
+        </p:txBody>
+      </p:sp>
+    </p:spTree>
+    <p:extLst>
+      <p:ext uri="{BB962C8B-B14F-4D97-AF65-F5344CB8AC3E}">
+        <p14:creationId xmlns:p14="http://schemas.microsoft.com/office/powerpoint/2010/main" val="3517390849"/>
+      </p:ext>
+    </p:extLst>
+  </p:cSld>
+  <p:clrMapOvr>
+    <a:masterClrMapping/>
+  </p:clrMapOvr>
+</p:notes>
+</file>
+
+<file path=ppt/notesSlides/notesSlide37.xml><?xml version="1.0" encoding="utf-8"?>
+<p:notes xmlns:a="http://schemas.openxmlformats.org/drawingml/2006/main" xmlns:r="http://schemas.openxmlformats.org/officeDocument/2006/relationships" xmlns:p="http://schemas.openxmlformats.org/presentationml/2006/main">
+  <p:cSld>
+    <p:spTree>
+      <p:nvGrpSpPr>
+        <p:cNvPr id="1" name=""/>
+        <p:cNvGrpSpPr/>
+        <p:nvPr/>
+      </p:nvGrpSpPr>
+      <p:grpSpPr>
+        <a:xfrm>
+          <a:off x="0" y="0"/>
+          <a:ext cx="0" cy="0"/>
+          <a:chOff x="0" y="0"/>
+          <a:chExt cx="0" cy="0"/>
+        </a:xfrm>
+      </p:grpSpPr>
+      <p:sp>
+        <p:nvSpPr>
+          <p:cNvPr id="2" name="Slide Image Placeholder 1"/>
+          <p:cNvSpPr>
+            <a:spLocks noGrp="1" noRot="1" noChangeAspect="1"/>
+          </p:cNvSpPr>
+          <p:nvPr>
+            <p:ph type="sldImg"/>
+          </p:nvPr>
+        </p:nvSpPr>
+        <p:spPr/>
+      </p:sp>
+      <p:sp>
+        <p:nvSpPr>
+          <p:cNvPr id="3" name="Notes Placeholder 2"/>
+          <p:cNvSpPr>
+            <a:spLocks noGrp="1"/>
+          </p:cNvSpPr>
+          <p:nvPr>
+            <p:ph type="body" idx="1"/>
+          </p:nvPr>
+        </p:nvSpPr>
+        <p:spPr/>
+        <p:txBody>
+          <a:bodyPr/>
+          <a:lstStyle/>
+          <a:p>
+            <a:r>
+              <a:rPr lang="en-GB" dirty="0"/>
+              <a:t>Last modified, great for server side caching.</a:t>
+            </a:r>
+          </a:p>
+          <a:p>
+            <a:r>
+              <a:rPr lang="en-GB" dirty="0"/>
+              <a:t>Helps remove calls to the DB, stick the date and </a:t>
+            </a:r>
+            <a:r>
+              <a:rPr lang="en-GB" dirty="0" err="1"/>
+              <a:t>recource</a:t>
+            </a:r>
+            <a:r>
+              <a:rPr lang="en-GB" dirty="0"/>
+              <a:t> id in Redis or something like that</a:t>
+            </a:r>
+          </a:p>
+        </p:txBody>
+      </p:sp>
+      <p:sp>
+        <p:nvSpPr>
+          <p:cNvPr id="4" name="Slide Number Placeholder 3"/>
+          <p:cNvSpPr>
+            <a:spLocks noGrp="1"/>
+          </p:cNvSpPr>
+          <p:nvPr>
+            <p:ph type="sldNum" sz="quarter" idx="5"/>
+          </p:nvPr>
+        </p:nvSpPr>
+        <p:spPr/>
+        <p:txBody>
+          <a:bodyPr/>
+          <a:lstStyle/>
+          <a:p>
+            <a:fld id="{3AB57619-29B7-4E12-9A8A-EA0B06592A0F}" type="slidenum">
+              <a:rPr lang="en-GB" smtClean="0"/>
+              <a:t>51</a:t>
+            </a:fld>
+            <a:endParaRPr lang="en-GB"/>
+          </a:p>
+        </p:txBody>
+      </p:sp>
+    </p:spTree>
+    <p:extLst>
+      <p:ext uri="{BB962C8B-B14F-4D97-AF65-F5344CB8AC3E}">
+        <p14:creationId xmlns:p14="http://schemas.microsoft.com/office/powerpoint/2010/main" val="4260130333"/>
+      </p:ext>
+    </p:extLst>
+  </p:cSld>
+  <p:clrMapOvr>
+    <a:masterClrMapping/>
+  </p:clrMapOvr>
+</p:notes>
+</file>
+
+<file path=ppt/notesSlides/notesSlide38.xml><?xml version="1.0" encoding="utf-8"?>
+<p:notes xmlns:a="http://schemas.openxmlformats.org/drawingml/2006/main" xmlns:r="http://schemas.openxmlformats.org/officeDocument/2006/relationships" xmlns:p="http://schemas.openxmlformats.org/presentationml/2006/main">
+  <p:cSld>
+    <p:spTree>
+      <p:nvGrpSpPr>
+        <p:cNvPr id="1" name=""/>
+        <p:cNvGrpSpPr/>
+        <p:nvPr/>
+      </p:nvGrpSpPr>
+      <p:grpSpPr>
+        <a:xfrm>
+          <a:off x="0" y="0"/>
+          <a:ext cx="0" cy="0"/>
+          <a:chOff x="0" y="0"/>
+          <a:chExt cx="0" cy="0"/>
+        </a:xfrm>
+      </p:grpSpPr>
+      <p:sp>
+        <p:nvSpPr>
+          <p:cNvPr id="2" name="Slide Image Placeholder 1"/>
+          <p:cNvSpPr>
+            <a:spLocks noGrp="1" noRot="1" noChangeAspect="1"/>
+          </p:cNvSpPr>
+          <p:nvPr>
+            <p:ph type="sldImg"/>
+          </p:nvPr>
+        </p:nvSpPr>
+        <p:spPr/>
+      </p:sp>
+      <p:sp>
+        <p:nvSpPr>
+          <p:cNvPr id="3" name="Notes Placeholder 2"/>
+          <p:cNvSpPr>
+            <a:spLocks noGrp="1"/>
+          </p:cNvSpPr>
+          <p:nvPr>
+            <p:ph type="body" idx="1"/>
+          </p:nvPr>
+        </p:nvSpPr>
+        <p:spPr/>
+        <p:txBody>
+          <a:bodyPr/>
+          <a:lstStyle/>
+          <a:p>
             <a:endParaRPr lang="en-GB" dirty="0"/>
           </a:p>
         </p:txBody>
@@ -3362,7 +3788,7 @@
 </p:notes>
 </file>
 
-<file path=ppt/notesSlides/notesSlide35.xml><?xml version="1.0" encoding="utf-8"?>
+<file path=ppt/notesSlides/notesSlide39.xml><?xml version="1.0" encoding="utf-8"?>
 <p:notes xmlns:a="http://schemas.openxmlformats.org/drawingml/2006/main" xmlns:r="http://schemas.openxmlformats.org/officeDocument/2006/relationships" xmlns:p="http://schemas.openxmlformats.org/presentationml/2006/main">
   <p:cSld>
     <p:spTree>
@@ -3857,10 +4283,27 @@
                 <a:ea typeface="+mn-ea"/>
                 <a:cs typeface="+mn-cs"/>
               </a:rPr>
-              <a:t>Empty collection?</a:t>
-            </a:r>
-          </a:p>
-          <a:p>
+              <a:t>Collections:</a:t>
+            </a:r>
+          </a:p>
+          <a:p>
+            <a:pPr marL="0" marR="0" lvl="0" indent="0" algn="l" defTabSz="914400" rtl="0" eaLnBrk="1" fontAlgn="auto" latinLnBrk="0" hangingPunct="1">
+              <a:lnSpc>
+                <a:spcPct val="100000"/>
+              </a:lnSpc>
+              <a:spcBef>
+                <a:spcPts val="0"/>
+              </a:spcBef>
+              <a:spcAft>
+                <a:spcPts val="0"/>
+              </a:spcAft>
+              <a:buClrTx/>
+              <a:buSzTx/>
+              <a:buFontTx/>
+              <a:buNone/>
+              <a:tabLst/>
+              <a:defRPr/>
+            </a:pPr>
             <a:r>
               <a:rPr lang="en-GB" sz="1200" b="0" i="0" kern="1200" dirty="0">
                 <a:solidFill>
@@ -3871,7 +4314,7 @@
                 <a:ea typeface="+mn-ea"/>
                 <a:cs typeface="+mn-cs"/>
               </a:rPr>
-              <a:t>Do you think 204 NO CONTENT is a valid response? </a:t>
+              <a:t>204 NO CONTENT is a valid response?  204 https://www.w3.org/Protocols/rfc2616/rfc2616-sec10.html#sec10.2.5</a:t>
             </a:r>
           </a:p>
           <a:p>
@@ -3885,8 +4328,61 @@
                 <a:ea typeface="+mn-ea"/>
                 <a:cs typeface="+mn-cs"/>
               </a:rPr>
-              <a:t>https://www.w3.org/Protocols/rfc2616/rfc2616-sec10.html#sec10.2.5</a:t>
-            </a:r>
+              <a:t>404 NOT FOUND? Doesn’t feel right.  Why? The resource exists it’s just empty.</a:t>
+            </a:r>
+          </a:p>
+          <a:p>
+            <a:endParaRPr lang="en-GB" sz="1200" b="0" i="0" kern="1200" dirty="0">
+              <a:solidFill>
+                <a:schemeClr val="tx1"/>
+              </a:solidFill>
+              <a:effectLst/>
+              <a:latin typeface="+mn-lt"/>
+              <a:ea typeface="+mn-ea"/>
+              <a:cs typeface="+mn-cs"/>
+            </a:endParaRPr>
+          </a:p>
+          <a:p>
+            <a:pPr marL="0" marR="0" lvl="0" indent="0" algn="l" defTabSz="914400" rtl="0" eaLnBrk="1" fontAlgn="auto" latinLnBrk="0" hangingPunct="1">
+              <a:lnSpc>
+                <a:spcPct val="100000"/>
+              </a:lnSpc>
+              <a:spcBef>
+                <a:spcPts val="0"/>
+              </a:spcBef>
+              <a:spcAft>
+                <a:spcPts val="0"/>
+              </a:spcAft>
+              <a:buClrTx/>
+              <a:buSzTx/>
+              <a:buFontTx/>
+              <a:buNone/>
+              <a:tabLst/>
+              <a:defRPr/>
+            </a:pPr>
+            <a:r>
+              <a:rPr lang="en-GB" sz="1200" b="0" i="0" kern="1200" dirty="0">
+                <a:solidFill>
+                  <a:schemeClr val="tx1"/>
+                </a:solidFill>
+                <a:effectLst/>
+                <a:latin typeface="+mn-lt"/>
+                <a:ea typeface="+mn-ea"/>
+                <a:cs typeface="+mn-cs"/>
+              </a:rPr>
+              <a:t>Returning an empty collection is much easier to deal with in client code. </a:t>
+            </a:r>
+          </a:p>
+          <a:p>
+            <a:endParaRPr lang="en-GB" sz="1200" b="0" i="0" kern="1200" dirty="0">
+              <a:solidFill>
+                <a:schemeClr val="tx1"/>
+              </a:solidFill>
+              <a:effectLst/>
+              <a:latin typeface="+mn-lt"/>
+              <a:ea typeface="+mn-ea"/>
+              <a:cs typeface="+mn-cs"/>
+            </a:endParaRPr>
           </a:p>
           <a:p>
             <a:endParaRPr lang="en-GB" dirty="0"/>
@@ -4045,12 +4541,7 @@
             <p:ph type="sldImg"/>
           </p:nvPr>
         </p:nvSpPr>
-        <p:spPr>
-          <a:xfrm>
-            <a:off x="685800" y="1143000"/>
-            <a:ext cx="5486400" cy="3086100"/>
-          </a:xfrm>
-        </p:spPr>
+        <p:spPr/>
       </p:sp>
       <p:sp>
         <p:nvSpPr>
@@ -4068,70 +4559,9 @@
           <a:lstStyle/>
           <a:p>
             <a:r>
-              <a:rPr lang="en-GB" sz="1200" b="0" i="0" kern="1200" dirty="0">
-                <a:solidFill>
-                  <a:schemeClr val="tx1"/>
-                </a:solidFill>
-                <a:effectLst/>
-                <a:latin typeface="+mn-lt"/>
-                <a:ea typeface="+mn-ea"/>
-                <a:cs typeface="+mn-cs"/>
-              </a:rPr>
-              <a:t>Should you return the body?</a:t>
-            </a:r>
-          </a:p>
-          <a:p>
-            <a:r>
-              <a:rPr lang="en-GB" sz="1200" b="0" i="0" kern="1200" dirty="0">
-                <a:solidFill>
-                  <a:schemeClr val="tx1"/>
-                </a:solidFill>
-                <a:effectLst/>
-                <a:latin typeface="+mn-lt"/>
-                <a:ea typeface="+mn-ea"/>
-                <a:cs typeface="+mn-cs"/>
-              </a:rPr>
-              <a:t>https://www.w3.org/Protocols/rfc2616/rfc2616-sec10.html#sec10.2.2</a:t>
-            </a:r>
-          </a:p>
-          <a:p>
-            <a:r>
-              <a:rPr lang="en-GB" sz="1200" b="0" i="0" kern="1200" dirty="0">
-                <a:solidFill>
-                  <a:schemeClr val="tx1"/>
-                </a:solidFill>
-                <a:effectLst/>
-                <a:latin typeface="+mn-lt"/>
-                <a:ea typeface="+mn-ea"/>
-                <a:cs typeface="+mn-cs"/>
-              </a:rPr>
-              <a:t>The resource must be created before returning 201</a:t>
-            </a:r>
-          </a:p>
-          <a:p>
-            <a:endParaRPr lang="en-GB" sz="1200" b="0" i="0" kern="1200" dirty="0">
-              <a:solidFill>
-                <a:schemeClr val="tx1"/>
-              </a:solidFill>
-              <a:effectLst/>
-              <a:latin typeface="+mn-lt"/>
-              <a:ea typeface="+mn-ea"/>
-              <a:cs typeface="+mn-cs"/>
-            </a:endParaRPr>
-          </a:p>
-          <a:p>
-            <a:endParaRPr lang="en-GB" sz="1200" b="0" i="0" kern="1200" dirty="0">
-              <a:solidFill>
-                <a:schemeClr val="tx1"/>
-              </a:solidFill>
-              <a:effectLst/>
-              <a:latin typeface="+mn-lt"/>
-              <a:ea typeface="+mn-ea"/>
-              <a:cs typeface="+mn-cs"/>
-            </a:endParaRPr>
-          </a:p>
-          <a:p>
-            <a:endParaRPr lang="en-GB" dirty="0"/>
+              <a:rPr lang="en-US" dirty="0"/>
+              <a:t>Basic POST example</a:t>
+            </a:r>
           </a:p>
         </p:txBody>
       </p:sp>
@@ -4152,7 +4582,7 @@
           <a:p>
             <a:fld id="{3AB57619-29B7-4E12-9A8A-EA0B06592A0F}" type="slidenum">
               <a:rPr lang="en-GB" smtClean="0"/>
-              <a:t>15</a:t>
+              <a:t>14</a:t>
             </a:fld>
             <a:endParaRPr lang="en-GB"/>
           </a:p>
@@ -4161,7 +4591,7 @@
     </p:spTree>
     <p:extLst>
       <p:ext uri="{BB962C8B-B14F-4D97-AF65-F5344CB8AC3E}">
-        <p14:creationId xmlns:p14="http://schemas.microsoft.com/office/powerpoint/2010/main" val="1485277645"/>
+        <p14:creationId xmlns:p14="http://schemas.microsoft.com/office/powerpoint/2010/main" val="3430861038"/>
       </p:ext>
     </p:extLst>
   </p:cSld>
@@ -4302,7 +4732,7 @@
           <a:p>
             <a:fld id="{F66FF14B-EAC5-478A-9185-96DE5867042E}" type="datetimeFigureOut">
               <a:rPr lang="en-GB" smtClean="0"/>
-              <a:t>02/07/2019</a:t>
+              <a:t>20/11/2019</a:t>
             </a:fld>
             <a:endParaRPr lang="en-GB"/>
           </a:p>
@@ -4472,7 +4902,7 @@
           <a:p>
             <a:fld id="{F66FF14B-EAC5-478A-9185-96DE5867042E}" type="datetimeFigureOut">
               <a:rPr lang="en-GB" smtClean="0"/>
-              <a:t>02/07/2019</a:t>
+              <a:t>20/11/2019</a:t>
             </a:fld>
             <a:endParaRPr lang="en-GB"/>
           </a:p>
@@ -4652,7 +5082,7 @@
           <a:p>
             <a:fld id="{F66FF14B-EAC5-478A-9185-96DE5867042E}" type="datetimeFigureOut">
               <a:rPr lang="en-GB" smtClean="0"/>
-              <a:t>02/07/2019</a:t>
+              <a:t>20/11/2019</a:t>
             </a:fld>
             <a:endParaRPr lang="en-GB"/>
           </a:p>
@@ -4822,7 +5252,7 @@
           <a:p>
             <a:fld id="{F66FF14B-EAC5-478A-9185-96DE5867042E}" type="datetimeFigureOut">
               <a:rPr lang="en-GB" smtClean="0"/>
-              <a:t>02/07/2019</a:t>
+              <a:t>20/11/2019</a:t>
             </a:fld>
             <a:endParaRPr lang="en-GB"/>
           </a:p>
@@ -5068,7 +5498,7 @@
           <a:p>
             <a:fld id="{F66FF14B-EAC5-478A-9185-96DE5867042E}" type="datetimeFigureOut">
               <a:rPr lang="en-GB" smtClean="0"/>
-              <a:t>02/07/2019</a:t>
+              <a:t>20/11/2019</a:t>
             </a:fld>
             <a:endParaRPr lang="en-GB"/>
           </a:p>
@@ -5300,7 +5730,7 @@
           <a:p>
             <a:fld id="{F66FF14B-EAC5-478A-9185-96DE5867042E}" type="datetimeFigureOut">
               <a:rPr lang="en-GB" smtClean="0"/>
-              <a:t>02/07/2019</a:t>
+              <a:t>20/11/2019</a:t>
             </a:fld>
             <a:endParaRPr lang="en-GB"/>
           </a:p>
@@ -5667,7 +6097,7 @@
           <a:p>
             <a:fld id="{F66FF14B-EAC5-478A-9185-96DE5867042E}" type="datetimeFigureOut">
               <a:rPr lang="en-GB" smtClean="0"/>
-              <a:t>02/07/2019</a:t>
+              <a:t>20/11/2019</a:t>
             </a:fld>
             <a:endParaRPr lang="en-GB"/>
           </a:p>
@@ -5785,7 +6215,7 @@
           <a:p>
             <a:fld id="{F66FF14B-EAC5-478A-9185-96DE5867042E}" type="datetimeFigureOut">
               <a:rPr lang="en-GB" smtClean="0"/>
-              <a:t>02/07/2019</a:t>
+              <a:t>20/11/2019</a:t>
             </a:fld>
             <a:endParaRPr lang="en-GB"/>
           </a:p>
@@ -5880,7 +6310,7 @@
           <a:p>
             <a:fld id="{F66FF14B-EAC5-478A-9185-96DE5867042E}" type="datetimeFigureOut">
               <a:rPr lang="en-GB" smtClean="0"/>
-              <a:t>02/07/2019</a:t>
+              <a:t>20/11/2019</a:t>
             </a:fld>
             <a:endParaRPr lang="en-GB"/>
           </a:p>
@@ -6157,7 +6587,7 @@
           <a:p>
             <a:fld id="{F66FF14B-EAC5-478A-9185-96DE5867042E}" type="datetimeFigureOut">
               <a:rPr lang="en-GB" smtClean="0"/>
-              <a:t>02/07/2019</a:t>
+              <a:t>20/11/2019</a:t>
             </a:fld>
             <a:endParaRPr lang="en-GB"/>
           </a:p>
@@ -6414,7 +6844,7 @@
           <a:p>
             <a:fld id="{F66FF14B-EAC5-478A-9185-96DE5867042E}" type="datetimeFigureOut">
               <a:rPr lang="en-GB" smtClean="0"/>
-              <a:t>02/07/2019</a:t>
+              <a:t>20/11/2019</a:t>
             </a:fld>
             <a:endParaRPr lang="en-GB"/>
           </a:p>
@@ -6627,7 +7057,7 @@
           <a:p>
             <a:fld id="{F66FF14B-EAC5-478A-9185-96DE5867042E}" type="datetimeFigureOut">
               <a:rPr lang="en-GB" smtClean="0"/>
-              <a:t>02/07/2019</a:t>
+              <a:t>20/11/2019</a:t>
             </a:fld>
             <a:endParaRPr lang="en-GB"/>
           </a:p>
@@ -7173,14 +7603,14 @@
             <p:ph idx="1"/>
             <p:extLst>
               <p:ext uri="{D42A27DB-BD31-4B8C-83A1-F6EECF244321}">
-                <p14:modId xmlns:p14="http://schemas.microsoft.com/office/powerpoint/2010/main" val="4191951944"/>
+                <p14:modId xmlns:p14="http://schemas.microsoft.com/office/powerpoint/2010/main" val="3833028351"/>
               </p:ext>
             </p:extLst>
           </p:nvPr>
         </p:nvGraphicFramePr>
         <p:xfrm>
           <a:off x="838200" y="1813682"/>
-          <a:ext cx="10515600" cy="3916680"/>
+          <a:ext cx="10515600" cy="4328160"/>
         </p:xfrm>
         <a:graphic>
           <a:graphicData uri="http://schemas.openxmlformats.org/drawingml/2006/table">
@@ -7298,7 +7728,7 @@
                     <a:p>
                       <a:r>
                         <a:rPr lang="en-GB" sz="2700" dirty="0"/>
-                        <a:t>Create</a:t>
+                        <a:t>Create … Update …  Add .. Read … On .. Off</a:t>
                       </a:r>
                     </a:p>
                   </a:txBody>
@@ -7929,7 +8359,7 @@
         <p:spPr>
           <a:xfrm>
             <a:off x="1524002" y="3195821"/>
-            <a:ext cx="8276895" cy="1692771"/>
+            <a:ext cx="8276895" cy="1600438"/>
           </a:xfrm>
           <a:prstGeom prst="rect">
             <a:avLst/>
@@ -7941,42 +8371,6 @@
           </a:bodyPr>
           <a:lstStyle/>
           <a:p>
-            <a:r>
-              <a:rPr lang="fr-FR" sz="2600" dirty="0">
-                <a:solidFill>
-                  <a:srgbClr val="0000FF"/>
-                </a:solidFill>
-                <a:latin typeface="Fira Code" panose="020B0509050000020004" pitchFamily="49" charset="0"/>
-              </a:rPr>
-              <a:t>HTTP</a:t>
-            </a:r>
-            <a:r>
-              <a:rPr lang="fr-FR" sz="2600" dirty="0">
-                <a:solidFill>
-                  <a:srgbClr val="000000"/>
-                </a:solidFill>
-                <a:latin typeface="Fira Code" panose="020B0509050000020004" pitchFamily="49" charset="0"/>
-              </a:rPr>
-              <a:t>/</a:t>
-            </a:r>
-            <a:r>
-              <a:rPr lang="fr-FR" sz="2600" dirty="0">
-                <a:solidFill>
-                  <a:srgbClr val="09885A"/>
-                </a:solidFill>
-                <a:latin typeface="Fira Code" panose="020B0509050000020004" pitchFamily="49" charset="0"/>
-              </a:rPr>
-              <a:t>1.1</a:t>
-            </a:r>
-            <a:r>
-              <a:rPr lang="fr-FR" sz="2600" dirty="0">
-                <a:solidFill>
-                  <a:srgbClr val="000000"/>
-                </a:solidFill>
-                <a:latin typeface="Fira Code" panose="020B0509050000020004" pitchFamily="49" charset="0"/>
-              </a:rPr>
-              <a:t> </a:t>
-            </a:r>
             <a:r>
               <a:rPr lang="fr-FR" sz="2600" dirty="0">
                 <a:solidFill>
@@ -8013,7 +8407,7 @@
           </a:p>
           <a:p>
             <a:r>
-              <a:rPr lang="fr-FR" sz="2600" dirty="0">
+              <a:rPr lang="fr-FR" sz="2000" dirty="0">
                 <a:solidFill>
                   <a:srgbClr val="000000"/>
                 </a:solidFill>
@@ -8022,7 +8416,7 @@
               <a:t>Content-Type: </a:t>
             </a:r>
             <a:r>
-              <a:rPr lang="fr-FR" sz="2600" dirty="0">
+              <a:rPr lang="fr-FR" sz="2000" dirty="0">
                 <a:solidFill>
                   <a:srgbClr val="A31515"/>
                 </a:solidFill>
@@ -8031,7 +8425,7 @@
               <a:t>application/</a:t>
             </a:r>
             <a:r>
-              <a:rPr lang="fr-FR" sz="2600" dirty="0" err="1">
+              <a:rPr lang="fr-FR" sz="2000" dirty="0" err="1">
                 <a:solidFill>
                   <a:srgbClr val="A31515"/>
                 </a:solidFill>
@@ -8039,7 +8433,7 @@
               </a:rPr>
               <a:t>json</a:t>
             </a:r>
-            <a:endParaRPr lang="fr-FR" sz="2600" dirty="0">
+            <a:endParaRPr lang="fr-FR" sz="2000" dirty="0">
               <a:solidFill>
                 <a:srgbClr val="000000"/>
               </a:solidFill>
@@ -8083,7 +8477,7 @@
         <p:spPr>
           <a:xfrm>
             <a:off x="1524001" y="727197"/>
-            <a:ext cx="10216054" cy="892552"/>
+            <a:ext cx="10216054" cy="800219"/>
           </a:xfrm>
           <a:prstGeom prst="rect">
             <a:avLst/>
@@ -8113,49 +8507,12 @@
                 <a:latin typeface="Fira Code Retina" panose="020B0509050000020004" pitchFamily="49" charset="0"/>
                 <a:ea typeface="Fira Code Retina" panose="020B0509050000020004" pitchFamily="49" charset="0"/>
               </a:rPr>
-              <a:t> https://example.com/tasks </a:t>
-            </a:r>
-            <a:r>
-              <a:rPr lang="en-GB" sz="2600" dirty="0">
-                <a:solidFill>
-                  <a:srgbClr val="0000FF"/>
-                </a:solidFill>
-                <a:latin typeface="Fira Code Retina" panose="020B0509050000020004" pitchFamily="49" charset="0"/>
-                <a:ea typeface="Fira Code Retina" panose="020B0509050000020004" pitchFamily="49" charset="0"/>
-              </a:rPr>
-              <a:t>HTTP</a:t>
-            </a:r>
-            <a:r>
-              <a:rPr lang="en-GB" sz="2600" dirty="0">
-                <a:solidFill>
-                  <a:srgbClr val="000000"/>
-                </a:solidFill>
-                <a:latin typeface="Fira Code Retina" panose="020B0509050000020004" pitchFamily="49" charset="0"/>
-                <a:ea typeface="Fira Code Retina" panose="020B0509050000020004" pitchFamily="49" charset="0"/>
-              </a:rPr>
-              <a:t>/</a:t>
-            </a:r>
-            <a:r>
-              <a:rPr lang="en-GB" sz="2600" dirty="0">
-                <a:solidFill>
-                  <a:srgbClr val="09885A"/>
-                </a:solidFill>
-                <a:latin typeface="Fira Code Retina" panose="020B0509050000020004" pitchFamily="49" charset="0"/>
-                <a:ea typeface="Fira Code Retina" panose="020B0509050000020004" pitchFamily="49" charset="0"/>
-              </a:rPr>
-              <a:t>1.1</a:t>
-            </a:r>
-            <a:endParaRPr lang="en-GB" sz="2600" dirty="0">
-              <a:solidFill>
-                <a:srgbClr val="000000"/>
-              </a:solidFill>
-              <a:latin typeface="Fira Code Retina" panose="020B0509050000020004" pitchFamily="49" charset="0"/>
-              <a:ea typeface="Fira Code Retina" panose="020B0509050000020004" pitchFamily="49" charset="0"/>
-            </a:endParaRPr>
-          </a:p>
-          <a:p>
-            <a:r>
-              <a:rPr lang="en-GB" sz="2600" dirty="0">
+              <a:t> https://example.com/tasks</a:t>
+            </a:r>
+          </a:p>
+          <a:p>
+            <a:r>
+              <a:rPr lang="en-GB" sz="2000" dirty="0">
                 <a:solidFill>
                   <a:srgbClr val="000000"/>
                 </a:solidFill>
@@ -8165,7 +8522,7 @@
               <a:t>Accept: </a:t>
             </a:r>
             <a:r>
-              <a:rPr lang="en-GB" sz="2600" dirty="0">
+              <a:rPr lang="en-GB" sz="2000" dirty="0">
                 <a:solidFill>
                   <a:srgbClr val="A31515"/>
                 </a:solidFill>
@@ -8174,7 +8531,7 @@
               </a:rPr>
               <a:t>application/json</a:t>
             </a:r>
-            <a:endParaRPr lang="en-GB" sz="2600" dirty="0">
+            <a:endParaRPr lang="en-GB" sz="2000" dirty="0">
               <a:solidFill>
                 <a:srgbClr val="000000"/>
               </a:solidFill>
@@ -8315,7 +8672,7 @@
             </a:r>
             <a:endParaRPr lang="fr-FR" sz="2600" dirty="0">
               <a:solidFill>
-                <a:srgbClr val="000000"/>
+                <a:srgbClr val="0000FF"/>
               </a:solidFill>
               <a:latin typeface="Fira Code" panose="020B0509050000020004" pitchFamily="49" charset="0"/>
             </a:endParaRPr>
@@ -10678,7 +11035,12 @@
             <p:ph idx="1"/>
           </p:nvPr>
         </p:nvSpPr>
-        <p:spPr/>
+        <p:spPr>
+          <a:xfrm>
+            <a:off x="838200" y="1460500"/>
+            <a:ext cx="10515600" cy="5032375"/>
+          </a:xfrm>
+        </p:spPr>
         <p:txBody>
           <a:bodyPr>
             <a:noAutofit/>
@@ -10693,7 +11055,17 @@
           <a:p>
             <a:r>
               <a:rPr lang="en-US" sz="3200" dirty="0"/>
-              <a:t>I work for Huddle.</a:t>
+              <a:t>I work for Huddle </a:t>
+            </a:r>
+            <a:r>
+              <a:rPr lang="en-US" sz="3200" dirty="0">
+                <a:hlinkClick r:id="rId2"/>
+              </a:rPr>
+              <a:t>www.huddle.com</a:t>
+            </a:r>
+            <a:r>
+              <a:rPr lang="en-US" sz="3200" dirty="0"/>
+              <a:t>.</a:t>
             </a:r>
           </a:p>
           <a:p>
@@ -10713,7 +11085,7 @@
           <a:p>
             <a:r>
               <a:rPr lang="en-US" sz="3200" dirty="0">
-                <a:hlinkClick r:id="rId2"/>
+                <a:hlinkClick r:id="rId3"/>
               </a:rPr>
               <a:t>https://github.com/holytshirt</a:t>
             </a:r>
@@ -10726,22 +11098,63 @@
             </a:r>
           </a:p>
           <a:p>
-            <a:r>
-              <a:rPr lang="en-US" sz="3000" dirty="0">
-                <a:hlinkClick r:id="rId3"/>
+            <a:pPr lvl="1"/>
+            <a:r>
+              <a:rPr lang="en-US" sz="2600" dirty="0">
+                <a:hlinkClick r:id="rId4"/>
               </a:rPr>
               <a:t>https://github.com/BrighterCommand</a:t>
             </a:r>
-            <a:endParaRPr lang="en-US" sz="3000" dirty="0"/>
-          </a:p>
-          <a:p>
-            <a:r>
-              <a:rPr lang="en-US" sz="3000" dirty="0">
-                <a:hlinkClick r:id="rId4"/>
+            <a:r>
+              <a:rPr lang="en-US" sz="2600" dirty="0"/>
+              <a:t> (</a:t>
+            </a:r>
+            <a:r>
+              <a:rPr lang="en-GB" dirty="0"/>
+              <a:t>Command Dispatcher, Processor, and Distributed Task Queue for dotnet and python</a:t>
+            </a:r>
+            <a:r>
+              <a:rPr lang="en-US" sz="2600" dirty="0"/>
+              <a:t>)</a:t>
+            </a:r>
+          </a:p>
+          <a:p>
+            <a:pPr lvl="1"/>
+            <a:r>
+              <a:rPr lang="en-US" sz="2600" dirty="0">
+                <a:hlinkClick r:id="rId5"/>
               </a:rPr>
               <a:t>https://github.com/openrasta/openrasta-core</a:t>
             </a:r>
-            <a:endParaRPr lang="en-US" sz="3000" dirty="0"/>
+            <a:r>
+              <a:rPr lang="en-US" sz="2600" dirty="0"/>
+              <a:t> (REST API for dotnet)</a:t>
+            </a:r>
+          </a:p>
+          <a:p>
+            <a:r>
+              <a:rPr lang="en-US" sz="3000" dirty="0"/>
+              <a:t>Ashtanga yogi </a:t>
+            </a:r>
+          </a:p>
+          <a:p>
+            <a:r>
+              <a:rPr lang="en-US" dirty="0"/>
+              <a:t>West Coast Swing </a:t>
+            </a:r>
+            <a:r>
+              <a:rPr lang="en-GB" dirty="0">
+                <a:hlinkClick r:id="rId6"/>
+              </a:rPr>
+              <a:t>https://www.facebook.com/londoncityswingwcs</a:t>
+            </a:r>
+            <a:endParaRPr lang="en-US" dirty="0"/>
+          </a:p>
+          <a:p>
+            <a:pPr marL="457200" lvl="1" indent="0">
+              <a:buNone/>
+            </a:pPr>
+            <a:endParaRPr lang="en-US" sz="2600" dirty="0"/>
           </a:p>
           <a:p>
             <a:endParaRPr lang="en-US" sz="3200" dirty="0"/>
@@ -11620,7 +12033,30 @@
                 <a:latin typeface="Fira Code Retina" panose="020B0509050000020004" pitchFamily="49" charset="0"/>
                 <a:ea typeface="Fira Code Retina" panose="020B0509050000020004" pitchFamily="49" charset="0"/>
               </a:rPr>
-              <a:t> https://example.com/tasks/1/editable </a:t>
+              <a:t> https://example.com/tasks/1/</a:t>
+            </a:r>
+            <a:r>
+              <a:rPr lang="en-GB" sz="2600" dirty="0">
+                <a:solidFill>
+                  <a:srgbClr val="000000"/>
+                </a:solidFill>
+                <a:highlight>
+                  <a:srgbClr val="FFFF00"/>
+                </a:highlight>
+                <a:latin typeface="Fira Code Retina" panose="020B0509050000020004" pitchFamily="49" charset="0"/>
+                <a:ea typeface="Fira Code Retina" panose="020B0509050000020004" pitchFamily="49" charset="0"/>
+              </a:rPr>
+              <a:t>editable</a:t>
+            </a:r>
+            <a:r>
+              <a:rPr lang="en-GB" sz="2600" dirty="0">
+                <a:solidFill>
+                  <a:srgbClr val="000000"/>
+                </a:solidFill>
+                <a:latin typeface="Fira Code Retina" panose="020B0509050000020004" pitchFamily="49" charset="0"/>
+                <a:ea typeface="Fira Code Retina" panose="020B0509050000020004" pitchFamily="49" charset="0"/>
+              </a:rPr>
+              <a:t> </a:t>
             </a:r>
             <a:r>
               <a:rPr lang="en-GB" sz="2600" dirty="0">
@@ -11962,7 +12398,30 @@
                 <a:latin typeface="Fira Code Retina" panose="020B0509050000020004" pitchFamily="49" charset="0"/>
                 <a:ea typeface="Fira Code Retina" panose="020B0509050000020004" pitchFamily="49" charset="0"/>
               </a:rPr>
-              <a:t> https://example.com/tasks/1/editable </a:t>
+              <a:t> https://example.com/tasks/1/</a:t>
+            </a:r>
+            <a:r>
+              <a:rPr lang="en-GB" sz="2600" dirty="0">
+                <a:solidFill>
+                  <a:srgbClr val="000000"/>
+                </a:solidFill>
+                <a:highlight>
+                  <a:srgbClr val="FFFF00"/>
+                </a:highlight>
+                <a:latin typeface="Fira Code Retina" panose="020B0509050000020004" pitchFamily="49" charset="0"/>
+                <a:ea typeface="Fira Code Retina" panose="020B0509050000020004" pitchFamily="49" charset="0"/>
+              </a:rPr>
+              <a:t>editable</a:t>
+            </a:r>
+            <a:r>
+              <a:rPr lang="en-GB" sz="2600" dirty="0">
+                <a:solidFill>
+                  <a:srgbClr val="000000"/>
+                </a:solidFill>
+                <a:latin typeface="Fira Code Retina" panose="020B0509050000020004" pitchFamily="49" charset="0"/>
+                <a:ea typeface="Fira Code Retina" panose="020B0509050000020004" pitchFamily="49" charset="0"/>
+              </a:rPr>
+              <a:t> </a:t>
             </a:r>
             <a:r>
               <a:rPr lang="en-GB" sz="2600" dirty="0">
@@ -12224,7 +12683,7 @@
         <p:spPr>
           <a:xfrm>
             <a:off x="783021" y="284337"/>
-            <a:ext cx="10625958" cy="2048253"/>
+            <a:ext cx="10625958" cy="1692771"/>
           </a:xfrm>
           <a:prstGeom prst="rect">
             <a:avLst/>
@@ -12274,7 +12733,30 @@
                 <a:latin typeface="Fira Code Retina" panose="020B0509050000020004" pitchFamily="49" charset="0"/>
                 <a:ea typeface="Fira Code Retina" panose="020B0509050000020004" pitchFamily="49" charset="0"/>
               </a:rPr>
-              <a:t>/tasks/1/status </a:t>
+              <a:t>/tasks/1/</a:t>
+            </a:r>
+            <a:r>
+              <a:rPr lang="en-GB" sz="2600" dirty="0">
+                <a:solidFill>
+                  <a:srgbClr val="000000"/>
+                </a:solidFill>
+                <a:highlight>
+                  <a:srgbClr val="FFFF00"/>
+                </a:highlight>
+                <a:latin typeface="Fira Code Retina" panose="020B0509050000020004" pitchFamily="49" charset="0"/>
+                <a:ea typeface="Fira Code Retina" panose="020B0509050000020004" pitchFamily="49" charset="0"/>
+              </a:rPr>
+              <a:t>status</a:t>
+            </a:r>
+            <a:r>
+              <a:rPr lang="en-GB" sz="2600" dirty="0">
+                <a:solidFill>
+                  <a:srgbClr val="000000"/>
+                </a:solidFill>
+                <a:latin typeface="Fira Code Retina" panose="020B0509050000020004" pitchFamily="49" charset="0"/>
+                <a:ea typeface="Fira Code Retina" panose="020B0509050000020004" pitchFamily="49" charset="0"/>
+              </a:rPr>
+              <a:t> </a:t>
             </a:r>
             <a:r>
               <a:rPr lang="en-GB" sz="2600" dirty="0">
@@ -12320,6 +12802,9 @@
                 <a:solidFill>
                   <a:srgbClr val="000000"/>
                 </a:solidFill>
+                <a:highlight>
+                  <a:srgbClr val="FFFF00"/>
+                </a:highlight>
                 <a:latin typeface="Fira Code Retina" panose="020B0509050000020004" pitchFamily="49" charset="0"/>
                 <a:ea typeface="Fira Code Retina" panose="020B0509050000020004" pitchFamily="49" charset="0"/>
               </a:rPr>
@@ -12330,6 +12815,9 @@
                 <a:solidFill>
                   <a:srgbClr val="A31515"/>
                 </a:solidFill>
+                <a:highlight>
+                  <a:srgbClr val="FFFF00"/>
+                </a:highlight>
                 <a:latin typeface="Fira Code Retina" panose="020B0509050000020004" pitchFamily="49" charset="0"/>
                 <a:ea typeface="Fira Code Retina" panose="020B0509050000020004" pitchFamily="49" charset="0"/>
               </a:rPr>
@@ -12340,6 +12828,9 @@
                 <a:solidFill>
                   <a:srgbClr val="A31515"/>
                 </a:solidFill>
+                <a:highlight>
+                  <a:srgbClr val="FFFF00"/>
+                </a:highlight>
                 <a:latin typeface="Fira Code Retina" panose="020B0509050000020004" pitchFamily="49" charset="0"/>
                 <a:ea typeface="Fira Code Retina" panose="020B0509050000020004" pitchFamily="49" charset="0"/>
               </a:rPr>
@@ -12349,6 +12840,9 @@
               <a:solidFill>
                 <a:srgbClr val="000000"/>
               </a:solidFill>
+              <a:highlight>
+                <a:srgbClr val="FFFF00"/>
+              </a:highlight>
               <a:latin typeface="Fira Code Retina" panose="020B0509050000020004" pitchFamily="49" charset="0"/>
               <a:ea typeface="Fira Code Retina" panose="020B0509050000020004" pitchFamily="49" charset="0"/>
             </a:endParaRPr>
@@ -12533,6 +13027,9 @@
                 <a:solidFill>
                   <a:srgbClr val="000000"/>
                 </a:solidFill>
+                <a:highlight>
+                  <a:srgbClr val="FFFF00"/>
+                </a:highlight>
                 <a:latin typeface="Fira Code Retina" panose="020B0509050000020004" pitchFamily="49" charset="0"/>
                 <a:ea typeface="Fira Code Retina" panose="020B0509050000020004" pitchFamily="49" charset="0"/>
               </a:rPr>
@@ -12543,6 +13040,9 @@
                 <a:solidFill>
                   <a:srgbClr val="A31515"/>
                 </a:solidFill>
+                <a:highlight>
+                  <a:srgbClr val="FFFF00"/>
+                </a:highlight>
                 <a:latin typeface="Fira Code Retina" panose="020B0509050000020004" pitchFamily="49" charset="0"/>
                 <a:ea typeface="Fira Code Retina" panose="020B0509050000020004" pitchFamily="49" charset="0"/>
               </a:rPr>
@@ -12552,6 +13052,9 @@
               <a:solidFill>
                 <a:srgbClr val="A31515"/>
               </a:solidFill>
+              <a:highlight>
+                <a:srgbClr val="FFFF00"/>
+              </a:highlight>
               <a:latin typeface="Fira Code Retina" panose="020B0509050000020004" pitchFamily="49" charset="0"/>
               <a:ea typeface="Fira Code Retina" panose="020B0509050000020004" pitchFamily="49" charset="0"/>
             </a:endParaRPr>

</xml_diff>